<commit_message>
Updating lectures, Weeks 1-4
</commit_message>
<xml_diff>
--- a/Thermo 2022 (Neshyba)/Lectures/Week 1 - Gas laws/Week 1.1 Introduction to Thermodynamics.pptx
+++ b/Thermo 2022 (Neshyba)/Lectures/Week 1 - Gas laws/Week 1.1 Introduction to Thermodynamics.pptx
@@ -17,7 +17,10 @@
     <p:sldId id="274" r:id="rId11"/>
     <p:sldId id="264" r:id="rId12"/>
     <p:sldId id="288" r:id="rId13"/>
-    <p:sldId id="262" r:id="rId14"/>
+    <p:sldId id="289" r:id="rId14"/>
+    <p:sldId id="290" r:id="rId15"/>
+    <p:sldId id="291" r:id="rId16"/>
+    <p:sldId id="262" r:id="rId17"/>
   </p:sldIdLst>
   <p:sldSz cx="12192000" cy="6858000"/>
   <p:notesSz cx="6858000" cy="9144000"/>
@@ -271,7 +274,7 @@
           <a:p>
             <a:fld id="{360BB814-64FE-A046-86EF-08998BAE6296}" type="datetimeFigureOut">
               <a:rPr lang="en-US" smtClean="0"/>
-              <a:t>10/3/21</a:t>
+              <a:t>8/15/22</a:t>
             </a:fld>
             <a:endParaRPr lang="en-US"/>
           </a:p>
@@ -469,7 +472,7 @@
           <a:p>
             <a:fld id="{360BB814-64FE-A046-86EF-08998BAE6296}" type="datetimeFigureOut">
               <a:rPr lang="en-US" smtClean="0"/>
-              <a:t>10/3/21</a:t>
+              <a:t>8/15/22</a:t>
             </a:fld>
             <a:endParaRPr lang="en-US"/>
           </a:p>
@@ -677,7 +680,7 @@
           <a:p>
             <a:fld id="{360BB814-64FE-A046-86EF-08998BAE6296}" type="datetimeFigureOut">
               <a:rPr lang="en-US" smtClean="0"/>
-              <a:t>10/3/21</a:t>
+              <a:t>8/15/22</a:t>
             </a:fld>
             <a:endParaRPr lang="en-US"/>
           </a:p>
@@ -875,7 +878,7 @@
           <a:p>
             <a:fld id="{360BB814-64FE-A046-86EF-08998BAE6296}" type="datetimeFigureOut">
               <a:rPr lang="en-US" smtClean="0"/>
-              <a:t>10/3/21</a:t>
+              <a:t>8/15/22</a:t>
             </a:fld>
             <a:endParaRPr lang="en-US"/>
           </a:p>
@@ -1150,7 +1153,7 @@
           <a:p>
             <a:fld id="{360BB814-64FE-A046-86EF-08998BAE6296}" type="datetimeFigureOut">
               <a:rPr lang="en-US" smtClean="0"/>
-              <a:t>10/3/21</a:t>
+              <a:t>8/15/22</a:t>
             </a:fld>
             <a:endParaRPr lang="en-US"/>
           </a:p>
@@ -1415,7 +1418,7 @@
           <a:p>
             <a:fld id="{360BB814-64FE-A046-86EF-08998BAE6296}" type="datetimeFigureOut">
               <a:rPr lang="en-US" smtClean="0"/>
-              <a:t>10/3/21</a:t>
+              <a:t>8/15/22</a:t>
             </a:fld>
             <a:endParaRPr lang="en-US"/>
           </a:p>
@@ -1827,7 +1830,7 @@
           <a:p>
             <a:fld id="{360BB814-64FE-A046-86EF-08998BAE6296}" type="datetimeFigureOut">
               <a:rPr lang="en-US" smtClean="0"/>
-              <a:t>10/3/21</a:t>
+              <a:t>8/15/22</a:t>
             </a:fld>
             <a:endParaRPr lang="en-US"/>
           </a:p>
@@ -1968,7 +1971,7 @@
           <a:p>
             <a:fld id="{360BB814-64FE-A046-86EF-08998BAE6296}" type="datetimeFigureOut">
               <a:rPr lang="en-US" smtClean="0"/>
-              <a:t>10/3/21</a:t>
+              <a:t>8/15/22</a:t>
             </a:fld>
             <a:endParaRPr lang="en-US"/>
           </a:p>
@@ -2081,7 +2084,7 @@
           <a:p>
             <a:fld id="{360BB814-64FE-A046-86EF-08998BAE6296}" type="datetimeFigureOut">
               <a:rPr lang="en-US" smtClean="0"/>
-              <a:t>10/3/21</a:t>
+              <a:t>8/15/22</a:t>
             </a:fld>
             <a:endParaRPr lang="en-US"/>
           </a:p>
@@ -2392,7 +2395,7 @@
           <a:p>
             <a:fld id="{360BB814-64FE-A046-86EF-08998BAE6296}" type="datetimeFigureOut">
               <a:rPr lang="en-US" smtClean="0"/>
-              <a:t>10/3/21</a:t>
+              <a:t>8/15/22</a:t>
             </a:fld>
             <a:endParaRPr lang="en-US"/>
           </a:p>
@@ -2680,7 +2683,7 @@
           <a:p>
             <a:fld id="{360BB814-64FE-A046-86EF-08998BAE6296}" type="datetimeFigureOut">
               <a:rPr lang="en-US" smtClean="0"/>
-              <a:t>10/3/21</a:t>
+              <a:t>8/15/22</a:t>
             </a:fld>
             <a:endParaRPr lang="en-US"/>
           </a:p>
@@ -2921,7 +2924,7 @@
           <a:p>
             <a:fld id="{360BB814-64FE-A046-86EF-08998BAE6296}" type="datetimeFigureOut">
               <a:rPr lang="en-US" smtClean="0"/>
-              <a:t>10/3/21</a:t>
+              <a:t>8/15/22</a:t>
             </a:fld>
             <a:endParaRPr lang="en-US"/>
           </a:p>
@@ -3521,10 +3524,10 @@
       </p:sp>
       <p:grpSp>
         <p:nvGrpSpPr>
-          <p:cNvPr id="39" name="Group 38">
-            <a:extLst>
-              <a:ext uri="{FF2B5EF4-FFF2-40B4-BE49-F238E27FC236}">
-                <a16:creationId xmlns:a16="http://schemas.microsoft.com/office/drawing/2014/main" id="{545C2FC8-5936-0A43-81B8-98F12DC31E54}"/>
+          <p:cNvPr id="2" name="Group 1">
+            <a:extLst>
+              <a:ext uri="{FF2B5EF4-FFF2-40B4-BE49-F238E27FC236}">
+                <a16:creationId xmlns:a16="http://schemas.microsoft.com/office/drawing/2014/main" id="{302EF95D-28DE-DD2E-7094-D5F4EC0BD51E}"/>
               </a:ext>
             </a:extLst>
           </p:cNvPr>
@@ -3533,18 +3536,1267 @@
         </p:nvGrpSpPr>
         <p:grpSpPr>
           <a:xfrm>
-            <a:off x="4864608" y="2098806"/>
-            <a:ext cx="5547560" cy="4458691"/>
-            <a:chOff x="5556904" y="1334126"/>
-            <a:chExt cx="6135424" cy="4961744"/>
+            <a:off x="4340386" y="2098806"/>
+            <a:ext cx="6071782" cy="4458691"/>
+            <a:chOff x="4340386" y="2098806"/>
+            <a:chExt cx="6071782" cy="4458691"/>
           </a:xfrm>
         </p:grpSpPr>
+        <p:grpSp>
+          <p:nvGrpSpPr>
+            <p:cNvPr id="39" name="Group 38">
+              <a:extLst>
+                <a:ext uri="{FF2B5EF4-FFF2-40B4-BE49-F238E27FC236}">
+                  <a16:creationId xmlns:a16="http://schemas.microsoft.com/office/drawing/2014/main" id="{545C2FC8-5936-0A43-81B8-98F12DC31E54}"/>
+                </a:ext>
+              </a:extLst>
+            </p:cNvPr>
+            <p:cNvGrpSpPr/>
+            <p:nvPr/>
+          </p:nvGrpSpPr>
+          <p:grpSpPr>
+            <a:xfrm>
+              <a:off x="4864608" y="2098806"/>
+              <a:ext cx="5547560" cy="4458691"/>
+              <a:chOff x="5556904" y="1334126"/>
+              <a:chExt cx="6135424" cy="4961744"/>
+            </a:xfrm>
+          </p:grpSpPr>
+          <p:sp>
+            <p:nvSpPr>
+              <p:cNvPr id="43" name="Frame 42">
+                <a:extLst>
+                  <a:ext uri="{FF2B5EF4-FFF2-40B4-BE49-F238E27FC236}">
+                    <a16:creationId xmlns:a16="http://schemas.microsoft.com/office/drawing/2014/main" id="{FDBB59FE-6FF1-1842-B776-7C23274411F4}"/>
+                  </a:ext>
+                </a:extLst>
+              </p:cNvPr>
+              <p:cNvSpPr/>
+              <p:nvPr/>
+            </p:nvSpPr>
+            <p:spPr>
+              <a:xfrm>
+                <a:off x="5556904" y="1334126"/>
+                <a:ext cx="6135424" cy="4961744"/>
+              </a:xfrm>
+              <a:prstGeom prst="frame">
+                <a:avLst>
+                  <a:gd name="adj1" fmla="val 1926"/>
+                </a:avLst>
+              </a:prstGeom>
+            </p:spPr>
+            <p:style>
+              <a:lnRef idx="2">
+                <a:schemeClr val="accent1">
+                  <a:shade val="50000"/>
+                </a:schemeClr>
+              </a:lnRef>
+              <a:fillRef idx="1">
+                <a:schemeClr val="accent1"/>
+              </a:fillRef>
+              <a:effectRef idx="0">
+                <a:schemeClr val="accent1"/>
+              </a:effectRef>
+              <a:fontRef idx="minor">
+                <a:schemeClr val="lt1"/>
+              </a:fontRef>
+            </p:style>
+            <p:txBody>
+              <a:bodyPr rtlCol="0" anchor="ctr"/>
+              <a:lstStyle/>
+              <a:p>
+                <a:pPr algn="ctr"/>
+                <a:endParaRPr lang="en-US">
+                  <a:solidFill>
+                    <a:schemeClr val="tx1"/>
+                  </a:solidFill>
+                </a:endParaRPr>
+              </a:p>
+            </p:txBody>
+          </p:sp>
+          <p:grpSp>
+            <p:nvGrpSpPr>
+              <p:cNvPr id="44" name="Group 43">
+                <a:extLst>
+                  <a:ext uri="{FF2B5EF4-FFF2-40B4-BE49-F238E27FC236}">
+                    <a16:creationId xmlns:a16="http://schemas.microsoft.com/office/drawing/2014/main" id="{FDBB7274-7F10-8D46-8786-3EE2A753431E}"/>
+                  </a:ext>
+                </a:extLst>
+              </p:cNvPr>
+              <p:cNvGrpSpPr/>
+              <p:nvPr/>
+            </p:nvGrpSpPr>
+            <p:grpSpPr>
+              <a:xfrm>
+                <a:off x="6016053" y="2083631"/>
+                <a:ext cx="4994223" cy="3667594"/>
+                <a:chOff x="6016053" y="2083631"/>
+                <a:chExt cx="4994223" cy="3667594"/>
+              </a:xfrm>
+              <a:solidFill>
+                <a:srgbClr val="7030A0"/>
+              </a:solidFill>
+            </p:grpSpPr>
+            <p:sp>
+              <p:nvSpPr>
+                <p:cNvPr id="64" name="Oval 63">
+                  <a:extLst>
+                    <a:ext uri="{FF2B5EF4-FFF2-40B4-BE49-F238E27FC236}">
+                      <a16:creationId xmlns:a16="http://schemas.microsoft.com/office/drawing/2014/main" id="{F2BA2CD8-1EA8-A344-AF63-92E476265DB8}"/>
+                    </a:ext>
+                  </a:extLst>
+                </p:cNvPr>
+                <p:cNvSpPr/>
+                <p:nvPr/>
+              </p:nvSpPr>
+              <p:spPr>
+                <a:xfrm>
+                  <a:off x="6625653" y="2263514"/>
+                  <a:ext cx="149902" cy="149901"/>
+                </a:xfrm>
+                <a:prstGeom prst="ellipse">
+                  <a:avLst/>
+                </a:prstGeom>
+                <a:grpFill/>
+                <a:ln>
+                  <a:solidFill>
+                    <a:srgbClr val="7030A0"/>
+                  </a:solidFill>
+                </a:ln>
+              </p:spPr>
+              <p:style>
+                <a:lnRef idx="2">
+                  <a:schemeClr val="accent1">
+                    <a:shade val="50000"/>
+                  </a:schemeClr>
+                </a:lnRef>
+                <a:fillRef idx="1">
+                  <a:schemeClr val="accent1"/>
+                </a:fillRef>
+                <a:effectRef idx="0">
+                  <a:schemeClr val="accent1"/>
+                </a:effectRef>
+                <a:fontRef idx="minor">
+                  <a:schemeClr val="lt1"/>
+                </a:fontRef>
+              </p:style>
+              <p:txBody>
+                <a:bodyPr rtlCol="0" anchor="ctr"/>
+                <a:lstStyle/>
+                <a:p>
+                  <a:pPr algn="ctr"/>
+                  <a:endParaRPr lang="en-US"/>
+                </a:p>
+              </p:txBody>
+            </p:sp>
+            <p:sp>
+              <p:nvSpPr>
+                <p:cNvPr id="65" name="Oval 64">
+                  <a:extLst>
+                    <a:ext uri="{FF2B5EF4-FFF2-40B4-BE49-F238E27FC236}">
+                      <a16:creationId xmlns:a16="http://schemas.microsoft.com/office/drawing/2014/main" id="{DB323461-6559-C044-B14A-A8A5F59ED031}"/>
+                    </a:ext>
+                  </a:extLst>
+                </p:cNvPr>
+                <p:cNvSpPr/>
+                <p:nvPr/>
+              </p:nvSpPr>
+              <p:spPr>
+                <a:xfrm>
+                  <a:off x="7182787" y="5144124"/>
+                  <a:ext cx="149902" cy="149901"/>
+                </a:xfrm>
+                <a:prstGeom prst="ellipse">
+                  <a:avLst/>
+                </a:prstGeom>
+                <a:grpFill/>
+                <a:ln>
+                  <a:solidFill>
+                    <a:srgbClr val="7030A0"/>
+                  </a:solidFill>
+                </a:ln>
+              </p:spPr>
+              <p:style>
+                <a:lnRef idx="2">
+                  <a:schemeClr val="accent1">
+                    <a:shade val="50000"/>
+                  </a:schemeClr>
+                </a:lnRef>
+                <a:fillRef idx="1">
+                  <a:schemeClr val="accent1"/>
+                </a:fillRef>
+                <a:effectRef idx="0">
+                  <a:schemeClr val="accent1"/>
+                </a:effectRef>
+                <a:fontRef idx="minor">
+                  <a:schemeClr val="lt1"/>
+                </a:fontRef>
+              </p:style>
+              <p:txBody>
+                <a:bodyPr rtlCol="0" anchor="ctr"/>
+                <a:lstStyle/>
+                <a:p>
+                  <a:pPr algn="ctr"/>
+                  <a:endParaRPr lang="en-US"/>
+                </a:p>
+              </p:txBody>
+            </p:sp>
+            <p:sp>
+              <p:nvSpPr>
+                <p:cNvPr id="66" name="Oval 65">
+                  <a:extLst>
+                    <a:ext uri="{FF2B5EF4-FFF2-40B4-BE49-F238E27FC236}">
+                      <a16:creationId xmlns:a16="http://schemas.microsoft.com/office/drawing/2014/main" id="{8910A7CE-7E37-FF48-BB3A-06E88F2ABDC0}"/>
+                    </a:ext>
+                  </a:extLst>
+                </p:cNvPr>
+                <p:cNvSpPr/>
+                <p:nvPr/>
+              </p:nvSpPr>
+              <p:spPr>
+                <a:xfrm>
+                  <a:off x="8521908" y="2913087"/>
+                  <a:ext cx="149902" cy="149901"/>
+                </a:xfrm>
+                <a:prstGeom prst="ellipse">
+                  <a:avLst/>
+                </a:prstGeom>
+                <a:grpFill/>
+                <a:ln>
+                  <a:solidFill>
+                    <a:srgbClr val="7030A0"/>
+                  </a:solidFill>
+                </a:ln>
+              </p:spPr>
+              <p:style>
+                <a:lnRef idx="2">
+                  <a:schemeClr val="accent1">
+                    <a:shade val="50000"/>
+                  </a:schemeClr>
+                </a:lnRef>
+                <a:fillRef idx="1">
+                  <a:schemeClr val="accent1"/>
+                </a:fillRef>
+                <a:effectRef idx="0">
+                  <a:schemeClr val="accent1"/>
+                </a:effectRef>
+                <a:fontRef idx="minor">
+                  <a:schemeClr val="lt1"/>
+                </a:fontRef>
+              </p:style>
+              <p:txBody>
+                <a:bodyPr rtlCol="0" anchor="ctr"/>
+                <a:lstStyle/>
+                <a:p>
+                  <a:pPr algn="ctr"/>
+                  <a:endParaRPr lang="en-US"/>
+                </a:p>
+              </p:txBody>
+            </p:sp>
+            <p:sp>
+              <p:nvSpPr>
+                <p:cNvPr id="67" name="Oval 66">
+                  <a:extLst>
+                    <a:ext uri="{FF2B5EF4-FFF2-40B4-BE49-F238E27FC236}">
+                      <a16:creationId xmlns:a16="http://schemas.microsoft.com/office/drawing/2014/main" id="{CB83A278-C54F-A746-A3C4-B6D42099AA45}"/>
+                    </a:ext>
+                  </a:extLst>
+                </p:cNvPr>
+                <p:cNvSpPr/>
+                <p:nvPr/>
+              </p:nvSpPr>
+              <p:spPr>
+                <a:xfrm>
+                  <a:off x="7490085" y="3629480"/>
+                  <a:ext cx="149902" cy="149901"/>
+                </a:xfrm>
+                <a:prstGeom prst="ellipse">
+                  <a:avLst/>
+                </a:prstGeom>
+                <a:grpFill/>
+                <a:ln>
+                  <a:solidFill>
+                    <a:srgbClr val="7030A0"/>
+                  </a:solidFill>
+                </a:ln>
+              </p:spPr>
+              <p:style>
+                <a:lnRef idx="2">
+                  <a:schemeClr val="accent1">
+                    <a:shade val="50000"/>
+                  </a:schemeClr>
+                </a:lnRef>
+                <a:fillRef idx="1">
+                  <a:schemeClr val="accent1"/>
+                </a:fillRef>
+                <a:effectRef idx="0">
+                  <a:schemeClr val="accent1"/>
+                </a:effectRef>
+                <a:fontRef idx="minor">
+                  <a:schemeClr val="lt1"/>
+                </a:fontRef>
+              </p:style>
+              <p:txBody>
+                <a:bodyPr rtlCol="0" anchor="ctr"/>
+                <a:lstStyle/>
+                <a:p>
+                  <a:pPr algn="ctr"/>
+                  <a:endParaRPr lang="en-US"/>
+                </a:p>
+              </p:txBody>
+            </p:sp>
+            <p:sp>
+              <p:nvSpPr>
+                <p:cNvPr id="68" name="Oval 67">
+                  <a:extLst>
+                    <a:ext uri="{FF2B5EF4-FFF2-40B4-BE49-F238E27FC236}">
+                      <a16:creationId xmlns:a16="http://schemas.microsoft.com/office/drawing/2014/main" id="{84E386B2-C90A-0741-8962-A1CA9D647598}"/>
+                    </a:ext>
+                  </a:extLst>
+                </p:cNvPr>
+                <p:cNvSpPr/>
+                <p:nvPr/>
+              </p:nvSpPr>
+              <p:spPr>
+                <a:xfrm>
+                  <a:off x="7639987" y="5601324"/>
+                  <a:ext cx="149902" cy="149901"/>
+                </a:xfrm>
+                <a:prstGeom prst="ellipse">
+                  <a:avLst/>
+                </a:prstGeom>
+                <a:grpFill/>
+                <a:ln>
+                  <a:solidFill>
+                    <a:srgbClr val="7030A0"/>
+                  </a:solidFill>
+                </a:ln>
+              </p:spPr>
+              <p:style>
+                <a:lnRef idx="2">
+                  <a:schemeClr val="accent1">
+                    <a:shade val="50000"/>
+                  </a:schemeClr>
+                </a:lnRef>
+                <a:fillRef idx="1">
+                  <a:schemeClr val="accent1"/>
+                </a:fillRef>
+                <a:effectRef idx="0">
+                  <a:schemeClr val="accent1"/>
+                </a:effectRef>
+                <a:fontRef idx="minor">
+                  <a:schemeClr val="lt1"/>
+                </a:fontRef>
+              </p:style>
+              <p:txBody>
+                <a:bodyPr rtlCol="0" anchor="ctr"/>
+                <a:lstStyle/>
+                <a:p>
+                  <a:pPr algn="ctr"/>
+                  <a:endParaRPr lang="en-US"/>
+                </a:p>
+              </p:txBody>
+            </p:sp>
+            <p:sp>
+              <p:nvSpPr>
+                <p:cNvPr id="69" name="Oval 68">
+                  <a:extLst>
+                    <a:ext uri="{FF2B5EF4-FFF2-40B4-BE49-F238E27FC236}">
+                      <a16:creationId xmlns:a16="http://schemas.microsoft.com/office/drawing/2014/main" id="{CAD76CC2-6B2E-1248-B931-41398D99FDBF}"/>
+                    </a:ext>
+                  </a:extLst>
+                </p:cNvPr>
+                <p:cNvSpPr/>
+                <p:nvPr/>
+              </p:nvSpPr>
+              <p:spPr>
+                <a:xfrm>
+                  <a:off x="10298243" y="2083631"/>
+                  <a:ext cx="149902" cy="149901"/>
+                </a:xfrm>
+                <a:prstGeom prst="ellipse">
+                  <a:avLst/>
+                </a:prstGeom>
+                <a:grpFill/>
+                <a:ln>
+                  <a:solidFill>
+                    <a:srgbClr val="7030A0"/>
+                  </a:solidFill>
+                </a:ln>
+              </p:spPr>
+              <p:style>
+                <a:lnRef idx="2">
+                  <a:schemeClr val="accent1">
+                    <a:shade val="50000"/>
+                  </a:schemeClr>
+                </a:lnRef>
+                <a:fillRef idx="1">
+                  <a:schemeClr val="accent1"/>
+                </a:fillRef>
+                <a:effectRef idx="0">
+                  <a:schemeClr val="accent1"/>
+                </a:effectRef>
+                <a:fontRef idx="minor">
+                  <a:schemeClr val="lt1"/>
+                </a:fontRef>
+              </p:style>
+              <p:txBody>
+                <a:bodyPr rtlCol="0" anchor="ctr"/>
+                <a:lstStyle/>
+                <a:p>
+                  <a:pPr algn="ctr"/>
+                  <a:endParaRPr lang="en-US"/>
+                </a:p>
+              </p:txBody>
+            </p:sp>
+            <p:sp>
+              <p:nvSpPr>
+                <p:cNvPr id="70" name="Oval 69">
+                  <a:extLst>
+                    <a:ext uri="{FF2B5EF4-FFF2-40B4-BE49-F238E27FC236}">
+                      <a16:creationId xmlns:a16="http://schemas.microsoft.com/office/drawing/2014/main" id="{5F7C570C-5FEF-514E-898A-563C3F9DEF8A}"/>
+                    </a:ext>
+                  </a:extLst>
+                </p:cNvPr>
+                <p:cNvSpPr/>
+                <p:nvPr/>
+              </p:nvSpPr>
+              <p:spPr>
+                <a:xfrm>
+                  <a:off x="8446957" y="4774366"/>
+                  <a:ext cx="149902" cy="149901"/>
+                </a:xfrm>
+                <a:prstGeom prst="ellipse">
+                  <a:avLst/>
+                </a:prstGeom>
+                <a:grpFill/>
+                <a:ln>
+                  <a:solidFill>
+                    <a:srgbClr val="7030A0"/>
+                  </a:solidFill>
+                </a:ln>
+              </p:spPr>
+              <p:style>
+                <a:lnRef idx="2">
+                  <a:schemeClr val="accent1">
+                    <a:shade val="50000"/>
+                  </a:schemeClr>
+                </a:lnRef>
+                <a:fillRef idx="1">
+                  <a:schemeClr val="accent1"/>
+                </a:fillRef>
+                <a:effectRef idx="0">
+                  <a:schemeClr val="accent1"/>
+                </a:effectRef>
+                <a:fontRef idx="minor">
+                  <a:schemeClr val="lt1"/>
+                </a:fontRef>
+              </p:style>
+              <p:txBody>
+                <a:bodyPr rtlCol="0" anchor="ctr"/>
+                <a:lstStyle/>
+                <a:p>
+                  <a:pPr algn="ctr"/>
+                  <a:endParaRPr lang="en-US"/>
+                </a:p>
+              </p:txBody>
+            </p:sp>
+            <p:sp>
+              <p:nvSpPr>
+                <p:cNvPr id="71" name="Oval 70">
+                  <a:extLst>
+                    <a:ext uri="{FF2B5EF4-FFF2-40B4-BE49-F238E27FC236}">
+                      <a16:creationId xmlns:a16="http://schemas.microsoft.com/office/drawing/2014/main" id="{F7ABC16B-BF0C-E040-B6ED-DEE57062114C}"/>
+                    </a:ext>
+                  </a:extLst>
+                </p:cNvPr>
+                <p:cNvSpPr/>
+                <p:nvPr/>
+              </p:nvSpPr>
+              <p:spPr>
+                <a:xfrm>
+                  <a:off x="6016053" y="3814998"/>
+                  <a:ext cx="149902" cy="149901"/>
+                </a:xfrm>
+                <a:prstGeom prst="ellipse">
+                  <a:avLst/>
+                </a:prstGeom>
+                <a:grpFill/>
+                <a:ln>
+                  <a:solidFill>
+                    <a:srgbClr val="7030A0"/>
+                  </a:solidFill>
+                </a:ln>
+              </p:spPr>
+              <p:style>
+                <a:lnRef idx="2">
+                  <a:schemeClr val="accent1">
+                    <a:shade val="50000"/>
+                  </a:schemeClr>
+                </a:lnRef>
+                <a:fillRef idx="1">
+                  <a:schemeClr val="accent1"/>
+                </a:fillRef>
+                <a:effectRef idx="0">
+                  <a:schemeClr val="accent1"/>
+                </a:effectRef>
+                <a:fontRef idx="minor">
+                  <a:schemeClr val="lt1"/>
+                </a:fontRef>
+              </p:style>
+              <p:txBody>
+                <a:bodyPr rtlCol="0" anchor="ctr"/>
+                <a:lstStyle/>
+                <a:p>
+                  <a:pPr algn="ctr"/>
+                  <a:endParaRPr lang="en-US"/>
+                </a:p>
+              </p:txBody>
+            </p:sp>
+            <p:sp>
+              <p:nvSpPr>
+                <p:cNvPr id="80" name="Oval 79">
+                  <a:extLst>
+                    <a:ext uri="{FF2B5EF4-FFF2-40B4-BE49-F238E27FC236}">
+                      <a16:creationId xmlns:a16="http://schemas.microsoft.com/office/drawing/2014/main" id="{C2EE5DAC-78E0-AE45-944A-03563605E901}"/>
+                    </a:ext>
+                  </a:extLst>
+                </p:cNvPr>
+                <p:cNvSpPr/>
+                <p:nvPr/>
+              </p:nvSpPr>
+              <p:spPr>
+                <a:xfrm>
+                  <a:off x="10860374" y="4624465"/>
+                  <a:ext cx="149902" cy="149901"/>
+                </a:xfrm>
+                <a:prstGeom prst="ellipse">
+                  <a:avLst/>
+                </a:prstGeom>
+                <a:grpFill/>
+                <a:ln>
+                  <a:solidFill>
+                    <a:srgbClr val="7030A0"/>
+                  </a:solidFill>
+                </a:ln>
+              </p:spPr>
+              <p:style>
+                <a:lnRef idx="2">
+                  <a:schemeClr val="accent1">
+                    <a:shade val="50000"/>
+                  </a:schemeClr>
+                </a:lnRef>
+                <a:fillRef idx="1">
+                  <a:schemeClr val="accent1"/>
+                </a:fillRef>
+                <a:effectRef idx="0">
+                  <a:schemeClr val="accent1"/>
+                </a:effectRef>
+                <a:fontRef idx="minor">
+                  <a:schemeClr val="lt1"/>
+                </a:fontRef>
+              </p:style>
+              <p:txBody>
+                <a:bodyPr rtlCol="0" anchor="ctr"/>
+                <a:lstStyle/>
+                <a:p>
+                  <a:pPr algn="ctr"/>
+                  <a:endParaRPr lang="en-US"/>
+                </a:p>
+              </p:txBody>
+            </p:sp>
+            <p:sp>
+              <p:nvSpPr>
+                <p:cNvPr id="81" name="Oval 80">
+                  <a:extLst>
+                    <a:ext uri="{FF2B5EF4-FFF2-40B4-BE49-F238E27FC236}">
+                      <a16:creationId xmlns:a16="http://schemas.microsoft.com/office/drawing/2014/main" id="{3F757F11-ABE5-1748-A2C4-108298160905}"/>
+                    </a:ext>
+                  </a:extLst>
+                </p:cNvPr>
+                <p:cNvSpPr/>
+                <p:nvPr/>
+              </p:nvSpPr>
+              <p:spPr>
+                <a:xfrm>
+                  <a:off x="7639987" y="5601324"/>
+                  <a:ext cx="149902" cy="149901"/>
+                </a:xfrm>
+                <a:prstGeom prst="ellipse">
+                  <a:avLst/>
+                </a:prstGeom>
+                <a:grpFill/>
+                <a:ln>
+                  <a:solidFill>
+                    <a:srgbClr val="7030A0"/>
+                  </a:solidFill>
+                </a:ln>
+              </p:spPr>
+              <p:style>
+                <a:lnRef idx="2">
+                  <a:schemeClr val="accent1">
+                    <a:shade val="50000"/>
+                  </a:schemeClr>
+                </a:lnRef>
+                <a:fillRef idx="1">
+                  <a:schemeClr val="accent1"/>
+                </a:fillRef>
+                <a:effectRef idx="0">
+                  <a:schemeClr val="accent1"/>
+                </a:effectRef>
+                <a:fontRef idx="minor">
+                  <a:schemeClr val="lt1"/>
+                </a:fontRef>
+              </p:style>
+              <p:txBody>
+                <a:bodyPr rtlCol="0" anchor="ctr"/>
+                <a:lstStyle/>
+                <a:p>
+                  <a:pPr algn="ctr"/>
+                  <a:endParaRPr lang="en-US"/>
+                </a:p>
+              </p:txBody>
+            </p:sp>
+          </p:grpSp>
+          <p:grpSp>
+            <p:nvGrpSpPr>
+              <p:cNvPr id="45" name="Group 44">
+                <a:extLst>
+                  <a:ext uri="{FF2B5EF4-FFF2-40B4-BE49-F238E27FC236}">
+                    <a16:creationId xmlns:a16="http://schemas.microsoft.com/office/drawing/2014/main" id="{D0ACCBB9-2E2A-6F4E-BF7A-BC0F4F29264F}"/>
+                  </a:ext>
+                </a:extLst>
+              </p:cNvPr>
+              <p:cNvGrpSpPr/>
+              <p:nvPr/>
+            </p:nvGrpSpPr>
+            <p:grpSpPr>
+              <a:xfrm>
+                <a:off x="6212174" y="1656413"/>
+                <a:ext cx="4910528" cy="4094812"/>
+                <a:chOff x="6016053" y="2263514"/>
+                <a:chExt cx="4087318" cy="3487711"/>
+              </a:xfrm>
+              <a:solidFill>
+                <a:srgbClr val="FF0000"/>
+              </a:solidFill>
+            </p:grpSpPr>
+            <p:sp>
+              <p:nvSpPr>
+                <p:cNvPr id="49" name="Oval 48">
+                  <a:extLst>
+                    <a:ext uri="{FF2B5EF4-FFF2-40B4-BE49-F238E27FC236}">
+                      <a16:creationId xmlns:a16="http://schemas.microsoft.com/office/drawing/2014/main" id="{D87A42C9-A420-374E-9E7A-582487750D08}"/>
+                    </a:ext>
+                  </a:extLst>
+                </p:cNvPr>
+                <p:cNvSpPr/>
+                <p:nvPr/>
+              </p:nvSpPr>
+              <p:spPr>
+                <a:xfrm>
+                  <a:off x="6625653" y="2263514"/>
+                  <a:ext cx="149902" cy="149901"/>
+                </a:xfrm>
+                <a:prstGeom prst="ellipse">
+                  <a:avLst/>
+                </a:prstGeom>
+                <a:grpFill/>
+                <a:ln>
+                  <a:solidFill>
+                    <a:srgbClr val="FF0000"/>
+                  </a:solidFill>
+                </a:ln>
+              </p:spPr>
+              <p:style>
+                <a:lnRef idx="2">
+                  <a:schemeClr val="accent1">
+                    <a:shade val="50000"/>
+                  </a:schemeClr>
+                </a:lnRef>
+                <a:fillRef idx="1">
+                  <a:schemeClr val="accent1"/>
+                </a:fillRef>
+                <a:effectRef idx="0">
+                  <a:schemeClr val="accent1"/>
+                </a:effectRef>
+                <a:fontRef idx="minor">
+                  <a:schemeClr val="lt1"/>
+                </a:fontRef>
+              </p:style>
+              <p:txBody>
+                <a:bodyPr rtlCol="0" anchor="ctr"/>
+                <a:lstStyle/>
+                <a:p>
+                  <a:pPr algn="ctr"/>
+                  <a:endParaRPr lang="en-US"/>
+                </a:p>
+              </p:txBody>
+            </p:sp>
+            <p:sp>
+              <p:nvSpPr>
+                <p:cNvPr id="50" name="Oval 49">
+                  <a:extLst>
+                    <a:ext uri="{FF2B5EF4-FFF2-40B4-BE49-F238E27FC236}">
+                      <a16:creationId xmlns:a16="http://schemas.microsoft.com/office/drawing/2014/main" id="{3E6AB123-8CBA-3B40-B3CD-3AEA9B89EF46}"/>
+                    </a:ext>
+                  </a:extLst>
+                </p:cNvPr>
+                <p:cNvSpPr/>
+                <p:nvPr/>
+              </p:nvSpPr>
+              <p:spPr>
+                <a:xfrm>
+                  <a:off x="7182787" y="5144124"/>
+                  <a:ext cx="149902" cy="149901"/>
+                </a:xfrm>
+                <a:prstGeom prst="ellipse">
+                  <a:avLst/>
+                </a:prstGeom>
+                <a:grpFill/>
+                <a:ln>
+                  <a:solidFill>
+                    <a:srgbClr val="FF0000"/>
+                  </a:solidFill>
+                </a:ln>
+              </p:spPr>
+              <p:style>
+                <a:lnRef idx="2">
+                  <a:schemeClr val="accent1">
+                    <a:shade val="50000"/>
+                  </a:schemeClr>
+                </a:lnRef>
+                <a:fillRef idx="1">
+                  <a:schemeClr val="accent1"/>
+                </a:fillRef>
+                <a:effectRef idx="0">
+                  <a:schemeClr val="accent1"/>
+                </a:effectRef>
+                <a:fontRef idx="minor">
+                  <a:schemeClr val="lt1"/>
+                </a:fontRef>
+              </p:style>
+              <p:txBody>
+                <a:bodyPr rtlCol="0" anchor="ctr"/>
+                <a:lstStyle/>
+                <a:p>
+                  <a:pPr algn="ctr"/>
+                  <a:endParaRPr lang="en-US"/>
+                </a:p>
+              </p:txBody>
+            </p:sp>
+            <p:sp>
+              <p:nvSpPr>
+                <p:cNvPr id="51" name="Oval 50">
+                  <a:extLst>
+                    <a:ext uri="{FF2B5EF4-FFF2-40B4-BE49-F238E27FC236}">
+                      <a16:creationId xmlns:a16="http://schemas.microsoft.com/office/drawing/2014/main" id="{3C5E64E1-1C29-024A-9D39-6D2EC44007DD}"/>
+                    </a:ext>
+                  </a:extLst>
+                </p:cNvPr>
+                <p:cNvSpPr/>
+                <p:nvPr/>
+              </p:nvSpPr>
+              <p:spPr>
+                <a:xfrm>
+                  <a:off x="8521908" y="2913087"/>
+                  <a:ext cx="149902" cy="149901"/>
+                </a:xfrm>
+                <a:prstGeom prst="ellipse">
+                  <a:avLst/>
+                </a:prstGeom>
+                <a:grpFill/>
+                <a:ln>
+                  <a:solidFill>
+                    <a:srgbClr val="FF0000"/>
+                  </a:solidFill>
+                </a:ln>
+              </p:spPr>
+              <p:style>
+                <a:lnRef idx="2">
+                  <a:schemeClr val="accent1">
+                    <a:shade val="50000"/>
+                  </a:schemeClr>
+                </a:lnRef>
+                <a:fillRef idx="1">
+                  <a:schemeClr val="accent1"/>
+                </a:fillRef>
+                <a:effectRef idx="0">
+                  <a:schemeClr val="accent1"/>
+                </a:effectRef>
+                <a:fontRef idx="minor">
+                  <a:schemeClr val="lt1"/>
+                </a:fontRef>
+              </p:style>
+              <p:txBody>
+                <a:bodyPr rtlCol="0" anchor="ctr"/>
+                <a:lstStyle/>
+                <a:p>
+                  <a:pPr algn="ctr"/>
+                  <a:endParaRPr lang="en-US"/>
+                </a:p>
+              </p:txBody>
+            </p:sp>
+            <p:sp>
+              <p:nvSpPr>
+                <p:cNvPr id="52" name="Oval 51">
+                  <a:extLst>
+                    <a:ext uri="{FF2B5EF4-FFF2-40B4-BE49-F238E27FC236}">
+                      <a16:creationId xmlns:a16="http://schemas.microsoft.com/office/drawing/2014/main" id="{50ED84D3-4977-C94D-8E78-28E8B97FFE7F}"/>
+                    </a:ext>
+                  </a:extLst>
+                </p:cNvPr>
+                <p:cNvSpPr/>
+                <p:nvPr/>
+              </p:nvSpPr>
+              <p:spPr>
+                <a:xfrm>
+                  <a:off x="6864246" y="3244729"/>
+                  <a:ext cx="149902" cy="149901"/>
+                </a:xfrm>
+                <a:prstGeom prst="ellipse">
+                  <a:avLst/>
+                </a:prstGeom>
+                <a:grpFill/>
+                <a:ln>
+                  <a:solidFill>
+                    <a:srgbClr val="FF0000"/>
+                  </a:solidFill>
+                </a:ln>
+              </p:spPr>
+              <p:style>
+                <a:lnRef idx="2">
+                  <a:schemeClr val="accent1">
+                    <a:shade val="50000"/>
+                  </a:schemeClr>
+                </a:lnRef>
+                <a:fillRef idx="1">
+                  <a:schemeClr val="accent1"/>
+                </a:fillRef>
+                <a:effectRef idx="0">
+                  <a:schemeClr val="accent1"/>
+                </a:effectRef>
+                <a:fontRef idx="minor">
+                  <a:schemeClr val="lt1"/>
+                </a:fontRef>
+              </p:style>
+              <p:txBody>
+                <a:bodyPr rtlCol="0" anchor="ctr"/>
+                <a:lstStyle/>
+                <a:p>
+                  <a:pPr algn="ctr"/>
+                  <a:endParaRPr lang="en-US"/>
+                </a:p>
+              </p:txBody>
+            </p:sp>
+            <p:sp>
+              <p:nvSpPr>
+                <p:cNvPr id="54" name="Oval 53">
+                  <a:extLst>
+                    <a:ext uri="{FF2B5EF4-FFF2-40B4-BE49-F238E27FC236}">
+                      <a16:creationId xmlns:a16="http://schemas.microsoft.com/office/drawing/2014/main" id="{EC489B30-8F1A-9846-9D0E-44F8290B6773}"/>
+                    </a:ext>
+                  </a:extLst>
+                </p:cNvPr>
+                <p:cNvSpPr/>
+                <p:nvPr/>
+              </p:nvSpPr>
+              <p:spPr>
+                <a:xfrm>
+                  <a:off x="7639987" y="5601324"/>
+                  <a:ext cx="149902" cy="149901"/>
+                </a:xfrm>
+                <a:prstGeom prst="ellipse">
+                  <a:avLst/>
+                </a:prstGeom>
+                <a:grpFill/>
+                <a:ln>
+                  <a:solidFill>
+                    <a:srgbClr val="FF0000"/>
+                  </a:solidFill>
+                </a:ln>
+              </p:spPr>
+              <p:style>
+                <a:lnRef idx="2">
+                  <a:schemeClr val="accent1">
+                    <a:shade val="50000"/>
+                  </a:schemeClr>
+                </a:lnRef>
+                <a:fillRef idx="1">
+                  <a:schemeClr val="accent1"/>
+                </a:fillRef>
+                <a:effectRef idx="0">
+                  <a:schemeClr val="accent1"/>
+                </a:effectRef>
+                <a:fontRef idx="minor">
+                  <a:schemeClr val="lt1"/>
+                </a:fontRef>
+              </p:style>
+              <p:txBody>
+                <a:bodyPr rtlCol="0" anchor="ctr"/>
+                <a:lstStyle/>
+                <a:p>
+                  <a:pPr algn="ctr"/>
+                  <a:endParaRPr lang="en-US"/>
+                </a:p>
+              </p:txBody>
+            </p:sp>
+            <p:sp>
+              <p:nvSpPr>
+                <p:cNvPr id="55" name="Oval 54">
+                  <a:extLst>
+                    <a:ext uri="{FF2B5EF4-FFF2-40B4-BE49-F238E27FC236}">
+                      <a16:creationId xmlns:a16="http://schemas.microsoft.com/office/drawing/2014/main" id="{CDDF3AE4-0079-914E-A2BE-D92682D40411}"/>
+                    </a:ext>
+                  </a:extLst>
+                </p:cNvPr>
+                <p:cNvSpPr/>
+                <p:nvPr/>
+              </p:nvSpPr>
+              <p:spPr>
+                <a:xfrm>
+                  <a:off x="9927236" y="2638265"/>
+                  <a:ext cx="149902" cy="149901"/>
+                </a:xfrm>
+                <a:prstGeom prst="ellipse">
+                  <a:avLst/>
+                </a:prstGeom>
+                <a:grpFill/>
+                <a:ln>
+                  <a:solidFill>
+                    <a:srgbClr val="FF0000"/>
+                  </a:solidFill>
+                </a:ln>
+              </p:spPr>
+              <p:style>
+                <a:lnRef idx="2">
+                  <a:schemeClr val="accent1">
+                    <a:shade val="50000"/>
+                  </a:schemeClr>
+                </a:lnRef>
+                <a:fillRef idx="1">
+                  <a:schemeClr val="accent1"/>
+                </a:fillRef>
+                <a:effectRef idx="0">
+                  <a:schemeClr val="accent1"/>
+                </a:effectRef>
+                <a:fontRef idx="minor">
+                  <a:schemeClr val="lt1"/>
+                </a:fontRef>
+              </p:style>
+              <p:txBody>
+                <a:bodyPr rtlCol="0" anchor="ctr"/>
+                <a:lstStyle/>
+                <a:p>
+                  <a:pPr algn="ctr"/>
+                  <a:endParaRPr lang="en-US"/>
+                </a:p>
+              </p:txBody>
+            </p:sp>
+            <p:sp>
+              <p:nvSpPr>
+                <p:cNvPr id="56" name="Oval 55">
+                  <a:extLst>
+                    <a:ext uri="{FF2B5EF4-FFF2-40B4-BE49-F238E27FC236}">
+                      <a16:creationId xmlns:a16="http://schemas.microsoft.com/office/drawing/2014/main" id="{1466E45F-9310-534F-BCEA-E11BC301C187}"/>
+                    </a:ext>
+                  </a:extLst>
+                </p:cNvPr>
+                <p:cNvSpPr/>
+                <p:nvPr/>
+              </p:nvSpPr>
+              <p:spPr>
+                <a:xfrm>
+                  <a:off x="8446957" y="4102945"/>
+                  <a:ext cx="149902" cy="149901"/>
+                </a:xfrm>
+                <a:prstGeom prst="ellipse">
+                  <a:avLst/>
+                </a:prstGeom>
+                <a:grpFill/>
+                <a:ln>
+                  <a:solidFill>
+                    <a:srgbClr val="FF0000"/>
+                  </a:solidFill>
+                </a:ln>
+              </p:spPr>
+              <p:style>
+                <a:lnRef idx="2">
+                  <a:schemeClr val="accent1">
+                    <a:shade val="50000"/>
+                  </a:schemeClr>
+                </a:lnRef>
+                <a:fillRef idx="1">
+                  <a:schemeClr val="accent1"/>
+                </a:fillRef>
+                <a:effectRef idx="0">
+                  <a:schemeClr val="accent1"/>
+                </a:effectRef>
+                <a:fontRef idx="minor">
+                  <a:schemeClr val="lt1"/>
+                </a:fontRef>
+              </p:style>
+              <p:txBody>
+                <a:bodyPr rtlCol="0" anchor="ctr"/>
+                <a:lstStyle/>
+                <a:p>
+                  <a:pPr algn="ctr"/>
+                  <a:endParaRPr lang="en-US"/>
+                </a:p>
+              </p:txBody>
+            </p:sp>
+            <p:sp>
+              <p:nvSpPr>
+                <p:cNvPr id="58" name="Oval 57">
+                  <a:extLst>
+                    <a:ext uri="{FF2B5EF4-FFF2-40B4-BE49-F238E27FC236}">
+                      <a16:creationId xmlns:a16="http://schemas.microsoft.com/office/drawing/2014/main" id="{662A3846-EB2F-FA4B-B728-FCCF037F2BCC}"/>
+                    </a:ext>
+                  </a:extLst>
+                </p:cNvPr>
+                <p:cNvSpPr/>
+                <p:nvPr/>
+              </p:nvSpPr>
+              <p:spPr>
+                <a:xfrm>
+                  <a:off x="6016053" y="3814998"/>
+                  <a:ext cx="149902" cy="149901"/>
+                </a:xfrm>
+                <a:prstGeom prst="ellipse">
+                  <a:avLst/>
+                </a:prstGeom>
+                <a:grpFill/>
+                <a:ln>
+                  <a:solidFill>
+                    <a:srgbClr val="FF0000"/>
+                  </a:solidFill>
+                </a:ln>
+              </p:spPr>
+              <p:style>
+                <a:lnRef idx="2">
+                  <a:schemeClr val="accent1">
+                    <a:shade val="50000"/>
+                  </a:schemeClr>
+                </a:lnRef>
+                <a:fillRef idx="1">
+                  <a:schemeClr val="accent1"/>
+                </a:fillRef>
+                <a:effectRef idx="0">
+                  <a:schemeClr val="accent1"/>
+                </a:effectRef>
+                <a:fontRef idx="minor">
+                  <a:schemeClr val="lt1"/>
+                </a:fontRef>
+              </p:style>
+              <p:txBody>
+                <a:bodyPr rtlCol="0" anchor="ctr"/>
+                <a:lstStyle/>
+                <a:p>
+                  <a:pPr algn="ctr"/>
+                  <a:endParaRPr lang="en-US"/>
+                </a:p>
+              </p:txBody>
+            </p:sp>
+            <p:sp>
+              <p:nvSpPr>
+                <p:cNvPr id="60" name="Oval 59">
+                  <a:extLst>
+                    <a:ext uri="{FF2B5EF4-FFF2-40B4-BE49-F238E27FC236}">
+                      <a16:creationId xmlns:a16="http://schemas.microsoft.com/office/drawing/2014/main" id="{C3DC340C-3C0A-7743-9C08-35C6494A0E5B}"/>
+                    </a:ext>
+                  </a:extLst>
+                </p:cNvPr>
+                <p:cNvSpPr/>
+                <p:nvPr/>
+              </p:nvSpPr>
+              <p:spPr>
+                <a:xfrm>
+                  <a:off x="9953469" y="4423108"/>
+                  <a:ext cx="149902" cy="149901"/>
+                </a:xfrm>
+                <a:prstGeom prst="ellipse">
+                  <a:avLst/>
+                </a:prstGeom>
+                <a:grpFill/>
+                <a:ln>
+                  <a:solidFill>
+                    <a:srgbClr val="FF0000"/>
+                  </a:solidFill>
+                </a:ln>
+              </p:spPr>
+              <p:style>
+                <a:lnRef idx="2">
+                  <a:schemeClr val="accent1">
+                    <a:shade val="50000"/>
+                  </a:schemeClr>
+                </a:lnRef>
+                <a:fillRef idx="1">
+                  <a:schemeClr val="accent1"/>
+                </a:fillRef>
+                <a:effectRef idx="0">
+                  <a:schemeClr val="accent1"/>
+                </a:effectRef>
+                <a:fontRef idx="minor">
+                  <a:schemeClr val="lt1"/>
+                </a:fontRef>
+              </p:style>
+              <p:txBody>
+                <a:bodyPr rtlCol="0" anchor="ctr"/>
+                <a:lstStyle/>
+                <a:p>
+                  <a:pPr algn="ctr"/>
+                  <a:endParaRPr lang="en-US"/>
+                </a:p>
+              </p:txBody>
+            </p:sp>
+            <p:sp>
+              <p:nvSpPr>
+                <p:cNvPr id="63" name="Oval 62">
+                  <a:extLst>
+                    <a:ext uri="{FF2B5EF4-FFF2-40B4-BE49-F238E27FC236}">
+                      <a16:creationId xmlns:a16="http://schemas.microsoft.com/office/drawing/2014/main" id="{448C3723-0BE2-0A4E-8CFD-C2D7D7FF3AB5}"/>
+                    </a:ext>
+                  </a:extLst>
+                </p:cNvPr>
+                <p:cNvSpPr/>
+                <p:nvPr/>
+              </p:nvSpPr>
+              <p:spPr>
+                <a:xfrm>
+                  <a:off x="7639987" y="5601324"/>
+                  <a:ext cx="149902" cy="149901"/>
+                </a:xfrm>
+                <a:prstGeom prst="ellipse">
+                  <a:avLst/>
+                </a:prstGeom>
+                <a:grpFill/>
+                <a:ln>
+                  <a:solidFill>
+                    <a:srgbClr val="FF0000"/>
+                  </a:solidFill>
+                </a:ln>
+              </p:spPr>
+              <p:style>
+                <a:lnRef idx="2">
+                  <a:schemeClr val="accent1">
+                    <a:shade val="50000"/>
+                  </a:schemeClr>
+                </a:lnRef>
+                <a:fillRef idx="1">
+                  <a:schemeClr val="accent1"/>
+                </a:fillRef>
+                <a:effectRef idx="0">
+                  <a:schemeClr val="accent1"/>
+                </a:effectRef>
+                <a:fontRef idx="minor">
+                  <a:schemeClr val="lt1"/>
+                </a:fontRef>
+              </p:style>
+              <p:txBody>
+                <a:bodyPr rtlCol="0" anchor="ctr"/>
+                <a:lstStyle/>
+                <a:p>
+                  <a:pPr algn="ctr"/>
+                  <a:endParaRPr lang="en-US"/>
+                </a:p>
+              </p:txBody>
+            </p:sp>
+          </p:grpSp>
+          <p:cxnSp>
+            <p:nvCxnSpPr>
+              <p:cNvPr id="47" name="Straight Arrow Connector 46">
+                <a:extLst>
+                  <a:ext uri="{FF2B5EF4-FFF2-40B4-BE49-F238E27FC236}">
+                    <a16:creationId xmlns:a16="http://schemas.microsoft.com/office/drawing/2014/main" id="{B45E93D3-6353-644A-B089-35406CEF0019}"/>
+                  </a:ext>
+                </a:extLst>
+              </p:cNvPr>
+              <p:cNvCxnSpPr>
+                <a:cxnSpLocks/>
+              </p:cNvCxnSpPr>
+              <p:nvPr/>
+            </p:nvCxnSpPr>
+            <p:spPr>
+              <a:xfrm flipH="1">
+                <a:off x="5726243" y="2413415"/>
+                <a:ext cx="839450" cy="469962"/>
+              </a:xfrm>
+              <a:prstGeom prst="straightConnector1">
+                <a:avLst/>
+              </a:prstGeom>
+              <a:ln w="63500">
+                <a:solidFill>
+                  <a:srgbClr val="7030A0"/>
+                </a:solidFill>
+                <a:tailEnd type="triangle"/>
+              </a:ln>
+            </p:spPr>
+            <p:style>
+              <a:lnRef idx="1">
+                <a:schemeClr val="accent1"/>
+              </a:lnRef>
+              <a:fillRef idx="0">
+                <a:schemeClr val="accent1"/>
+              </a:fillRef>
+              <a:effectRef idx="0">
+                <a:schemeClr val="accent1"/>
+              </a:effectRef>
+              <a:fontRef idx="minor">
+                <a:schemeClr val="tx1"/>
+              </a:fontRef>
+            </p:style>
+          </p:cxnSp>
+        </p:grpSp>
+        <p:cxnSp>
+          <p:nvCxnSpPr>
+            <p:cNvPr id="35" name="Straight Arrow Connector 34">
+              <a:extLst>
+                <a:ext uri="{FF2B5EF4-FFF2-40B4-BE49-F238E27FC236}">
+                  <a16:creationId xmlns:a16="http://schemas.microsoft.com/office/drawing/2014/main" id="{98E451C6-03F1-BA45-913C-67078C026BA8}"/>
+                </a:ext>
+              </a:extLst>
+            </p:cNvPr>
+            <p:cNvCxnSpPr>
+              <a:cxnSpLocks/>
+            </p:cNvCxnSpPr>
+            <p:nvPr/>
+          </p:nvCxnSpPr>
+          <p:spPr>
+            <a:xfrm>
+              <a:off x="5062817" y="3580243"/>
+              <a:ext cx="557114" cy="187085"/>
+            </a:xfrm>
+            <a:prstGeom prst="straightConnector1">
+              <a:avLst/>
+            </a:prstGeom>
+            <a:ln w="63500">
+              <a:solidFill>
+                <a:schemeClr val="accent1"/>
+              </a:solidFill>
+              <a:tailEnd type="triangle"/>
+            </a:ln>
+          </p:spPr>
+          <p:style>
+            <a:lnRef idx="1">
+              <a:schemeClr val="accent1"/>
+            </a:lnRef>
+            <a:fillRef idx="0">
+              <a:schemeClr val="accent1"/>
+            </a:fillRef>
+            <a:effectRef idx="0">
+              <a:schemeClr val="accent1"/>
+            </a:effectRef>
+            <a:fontRef idx="minor">
+              <a:schemeClr val="tx1"/>
+            </a:fontRef>
+          </p:style>
+        </p:cxnSp>
         <p:sp>
           <p:nvSpPr>
-            <p:cNvPr id="43" name="Frame 42">
+            <p:cNvPr id="4" name="Left Arrow 3">
               <a:extLst>
                 <a:ext uri="{FF2B5EF4-FFF2-40B4-BE49-F238E27FC236}">
-                  <a16:creationId xmlns:a16="http://schemas.microsoft.com/office/drawing/2014/main" id="{FDBB59FE-6FF1-1842-B776-7C23274411F4}"/>
+                  <a16:creationId xmlns:a16="http://schemas.microsoft.com/office/drawing/2014/main" id="{6219A385-E132-1D4A-B625-FC7900D5F63C}"/>
                 </a:ext>
               </a:extLst>
             </p:cNvPr>
@@ -3553,13 +4805,11 @@
           </p:nvSpPr>
           <p:spPr>
             <a:xfrm>
-              <a:off x="5556904" y="1334126"/>
-              <a:ext cx="6135424" cy="4961744"/>
+              <a:off x="4340386" y="4183438"/>
+              <a:ext cx="609566" cy="483425"/>
             </a:xfrm>
-            <a:prstGeom prst="frame">
-              <a:avLst>
-                <a:gd name="adj1" fmla="val 1926"/>
-              </a:avLst>
+            <a:prstGeom prst="leftArrow">
+              <a:avLst/>
             </a:prstGeom>
           </p:spPr>
           <p:style>
@@ -3583,1237 +4833,11 @@
             <a:lstStyle/>
             <a:p>
               <a:pPr algn="ctr"/>
-              <a:endParaRPr lang="en-US">
-                <a:solidFill>
-                  <a:schemeClr val="tx1"/>
-                </a:solidFill>
-              </a:endParaRPr>
+              <a:endParaRPr lang="en-US"/>
             </a:p>
           </p:txBody>
         </p:sp>
-        <p:grpSp>
-          <p:nvGrpSpPr>
-            <p:cNvPr id="44" name="Group 43">
-              <a:extLst>
-                <a:ext uri="{FF2B5EF4-FFF2-40B4-BE49-F238E27FC236}">
-                  <a16:creationId xmlns:a16="http://schemas.microsoft.com/office/drawing/2014/main" id="{FDBB7274-7F10-8D46-8786-3EE2A753431E}"/>
-                </a:ext>
-              </a:extLst>
-            </p:cNvPr>
-            <p:cNvGrpSpPr/>
-            <p:nvPr/>
-          </p:nvGrpSpPr>
-          <p:grpSpPr>
-            <a:xfrm>
-              <a:off x="6016053" y="2083631"/>
-              <a:ext cx="4994223" cy="3667594"/>
-              <a:chOff x="6016053" y="2083631"/>
-              <a:chExt cx="4994223" cy="3667594"/>
-            </a:xfrm>
-            <a:solidFill>
-              <a:srgbClr val="7030A0"/>
-            </a:solidFill>
-          </p:grpSpPr>
-          <p:sp>
-            <p:nvSpPr>
-              <p:cNvPr id="64" name="Oval 63">
-                <a:extLst>
-                  <a:ext uri="{FF2B5EF4-FFF2-40B4-BE49-F238E27FC236}">
-                    <a16:creationId xmlns:a16="http://schemas.microsoft.com/office/drawing/2014/main" id="{F2BA2CD8-1EA8-A344-AF63-92E476265DB8}"/>
-                  </a:ext>
-                </a:extLst>
-              </p:cNvPr>
-              <p:cNvSpPr/>
-              <p:nvPr/>
-            </p:nvSpPr>
-            <p:spPr>
-              <a:xfrm>
-                <a:off x="6625653" y="2263514"/>
-                <a:ext cx="149902" cy="149901"/>
-              </a:xfrm>
-              <a:prstGeom prst="ellipse">
-                <a:avLst/>
-              </a:prstGeom>
-              <a:grpFill/>
-              <a:ln>
-                <a:solidFill>
-                  <a:srgbClr val="7030A0"/>
-                </a:solidFill>
-              </a:ln>
-            </p:spPr>
-            <p:style>
-              <a:lnRef idx="2">
-                <a:schemeClr val="accent1">
-                  <a:shade val="50000"/>
-                </a:schemeClr>
-              </a:lnRef>
-              <a:fillRef idx="1">
-                <a:schemeClr val="accent1"/>
-              </a:fillRef>
-              <a:effectRef idx="0">
-                <a:schemeClr val="accent1"/>
-              </a:effectRef>
-              <a:fontRef idx="minor">
-                <a:schemeClr val="lt1"/>
-              </a:fontRef>
-            </p:style>
-            <p:txBody>
-              <a:bodyPr rtlCol="0" anchor="ctr"/>
-              <a:lstStyle/>
-              <a:p>
-                <a:pPr algn="ctr"/>
-                <a:endParaRPr lang="en-US"/>
-              </a:p>
-            </p:txBody>
-          </p:sp>
-          <p:sp>
-            <p:nvSpPr>
-              <p:cNvPr id="65" name="Oval 64">
-                <a:extLst>
-                  <a:ext uri="{FF2B5EF4-FFF2-40B4-BE49-F238E27FC236}">
-                    <a16:creationId xmlns:a16="http://schemas.microsoft.com/office/drawing/2014/main" id="{DB323461-6559-C044-B14A-A8A5F59ED031}"/>
-                  </a:ext>
-                </a:extLst>
-              </p:cNvPr>
-              <p:cNvSpPr/>
-              <p:nvPr/>
-            </p:nvSpPr>
-            <p:spPr>
-              <a:xfrm>
-                <a:off x="7182787" y="5144124"/>
-                <a:ext cx="149902" cy="149901"/>
-              </a:xfrm>
-              <a:prstGeom prst="ellipse">
-                <a:avLst/>
-              </a:prstGeom>
-              <a:grpFill/>
-              <a:ln>
-                <a:solidFill>
-                  <a:srgbClr val="7030A0"/>
-                </a:solidFill>
-              </a:ln>
-            </p:spPr>
-            <p:style>
-              <a:lnRef idx="2">
-                <a:schemeClr val="accent1">
-                  <a:shade val="50000"/>
-                </a:schemeClr>
-              </a:lnRef>
-              <a:fillRef idx="1">
-                <a:schemeClr val="accent1"/>
-              </a:fillRef>
-              <a:effectRef idx="0">
-                <a:schemeClr val="accent1"/>
-              </a:effectRef>
-              <a:fontRef idx="minor">
-                <a:schemeClr val="lt1"/>
-              </a:fontRef>
-            </p:style>
-            <p:txBody>
-              <a:bodyPr rtlCol="0" anchor="ctr"/>
-              <a:lstStyle/>
-              <a:p>
-                <a:pPr algn="ctr"/>
-                <a:endParaRPr lang="en-US"/>
-              </a:p>
-            </p:txBody>
-          </p:sp>
-          <p:sp>
-            <p:nvSpPr>
-              <p:cNvPr id="66" name="Oval 65">
-                <a:extLst>
-                  <a:ext uri="{FF2B5EF4-FFF2-40B4-BE49-F238E27FC236}">
-                    <a16:creationId xmlns:a16="http://schemas.microsoft.com/office/drawing/2014/main" id="{8910A7CE-7E37-FF48-BB3A-06E88F2ABDC0}"/>
-                  </a:ext>
-                </a:extLst>
-              </p:cNvPr>
-              <p:cNvSpPr/>
-              <p:nvPr/>
-            </p:nvSpPr>
-            <p:spPr>
-              <a:xfrm>
-                <a:off x="8521908" y="2913087"/>
-                <a:ext cx="149902" cy="149901"/>
-              </a:xfrm>
-              <a:prstGeom prst="ellipse">
-                <a:avLst/>
-              </a:prstGeom>
-              <a:grpFill/>
-              <a:ln>
-                <a:solidFill>
-                  <a:srgbClr val="7030A0"/>
-                </a:solidFill>
-              </a:ln>
-            </p:spPr>
-            <p:style>
-              <a:lnRef idx="2">
-                <a:schemeClr val="accent1">
-                  <a:shade val="50000"/>
-                </a:schemeClr>
-              </a:lnRef>
-              <a:fillRef idx="1">
-                <a:schemeClr val="accent1"/>
-              </a:fillRef>
-              <a:effectRef idx="0">
-                <a:schemeClr val="accent1"/>
-              </a:effectRef>
-              <a:fontRef idx="minor">
-                <a:schemeClr val="lt1"/>
-              </a:fontRef>
-            </p:style>
-            <p:txBody>
-              <a:bodyPr rtlCol="0" anchor="ctr"/>
-              <a:lstStyle/>
-              <a:p>
-                <a:pPr algn="ctr"/>
-                <a:endParaRPr lang="en-US"/>
-              </a:p>
-            </p:txBody>
-          </p:sp>
-          <p:sp>
-            <p:nvSpPr>
-              <p:cNvPr id="67" name="Oval 66">
-                <a:extLst>
-                  <a:ext uri="{FF2B5EF4-FFF2-40B4-BE49-F238E27FC236}">
-                    <a16:creationId xmlns:a16="http://schemas.microsoft.com/office/drawing/2014/main" id="{CB83A278-C54F-A746-A3C4-B6D42099AA45}"/>
-                  </a:ext>
-                </a:extLst>
-              </p:cNvPr>
-              <p:cNvSpPr/>
-              <p:nvPr/>
-            </p:nvSpPr>
-            <p:spPr>
-              <a:xfrm>
-                <a:off x="7490085" y="3629480"/>
-                <a:ext cx="149902" cy="149901"/>
-              </a:xfrm>
-              <a:prstGeom prst="ellipse">
-                <a:avLst/>
-              </a:prstGeom>
-              <a:grpFill/>
-              <a:ln>
-                <a:solidFill>
-                  <a:srgbClr val="7030A0"/>
-                </a:solidFill>
-              </a:ln>
-            </p:spPr>
-            <p:style>
-              <a:lnRef idx="2">
-                <a:schemeClr val="accent1">
-                  <a:shade val="50000"/>
-                </a:schemeClr>
-              </a:lnRef>
-              <a:fillRef idx="1">
-                <a:schemeClr val="accent1"/>
-              </a:fillRef>
-              <a:effectRef idx="0">
-                <a:schemeClr val="accent1"/>
-              </a:effectRef>
-              <a:fontRef idx="minor">
-                <a:schemeClr val="lt1"/>
-              </a:fontRef>
-            </p:style>
-            <p:txBody>
-              <a:bodyPr rtlCol="0" anchor="ctr"/>
-              <a:lstStyle/>
-              <a:p>
-                <a:pPr algn="ctr"/>
-                <a:endParaRPr lang="en-US"/>
-              </a:p>
-            </p:txBody>
-          </p:sp>
-          <p:sp>
-            <p:nvSpPr>
-              <p:cNvPr id="68" name="Oval 67">
-                <a:extLst>
-                  <a:ext uri="{FF2B5EF4-FFF2-40B4-BE49-F238E27FC236}">
-                    <a16:creationId xmlns:a16="http://schemas.microsoft.com/office/drawing/2014/main" id="{84E386B2-C90A-0741-8962-A1CA9D647598}"/>
-                  </a:ext>
-                </a:extLst>
-              </p:cNvPr>
-              <p:cNvSpPr/>
-              <p:nvPr/>
-            </p:nvSpPr>
-            <p:spPr>
-              <a:xfrm>
-                <a:off x="7639987" y="5601324"/>
-                <a:ext cx="149902" cy="149901"/>
-              </a:xfrm>
-              <a:prstGeom prst="ellipse">
-                <a:avLst/>
-              </a:prstGeom>
-              <a:grpFill/>
-              <a:ln>
-                <a:solidFill>
-                  <a:srgbClr val="7030A0"/>
-                </a:solidFill>
-              </a:ln>
-            </p:spPr>
-            <p:style>
-              <a:lnRef idx="2">
-                <a:schemeClr val="accent1">
-                  <a:shade val="50000"/>
-                </a:schemeClr>
-              </a:lnRef>
-              <a:fillRef idx="1">
-                <a:schemeClr val="accent1"/>
-              </a:fillRef>
-              <a:effectRef idx="0">
-                <a:schemeClr val="accent1"/>
-              </a:effectRef>
-              <a:fontRef idx="minor">
-                <a:schemeClr val="lt1"/>
-              </a:fontRef>
-            </p:style>
-            <p:txBody>
-              <a:bodyPr rtlCol="0" anchor="ctr"/>
-              <a:lstStyle/>
-              <a:p>
-                <a:pPr algn="ctr"/>
-                <a:endParaRPr lang="en-US"/>
-              </a:p>
-            </p:txBody>
-          </p:sp>
-          <p:sp>
-            <p:nvSpPr>
-              <p:cNvPr id="69" name="Oval 68">
-                <a:extLst>
-                  <a:ext uri="{FF2B5EF4-FFF2-40B4-BE49-F238E27FC236}">
-                    <a16:creationId xmlns:a16="http://schemas.microsoft.com/office/drawing/2014/main" id="{CAD76CC2-6B2E-1248-B931-41398D99FDBF}"/>
-                  </a:ext>
-                </a:extLst>
-              </p:cNvPr>
-              <p:cNvSpPr/>
-              <p:nvPr/>
-            </p:nvSpPr>
-            <p:spPr>
-              <a:xfrm>
-                <a:off x="10298243" y="2083631"/>
-                <a:ext cx="149902" cy="149901"/>
-              </a:xfrm>
-              <a:prstGeom prst="ellipse">
-                <a:avLst/>
-              </a:prstGeom>
-              <a:grpFill/>
-              <a:ln>
-                <a:solidFill>
-                  <a:srgbClr val="7030A0"/>
-                </a:solidFill>
-              </a:ln>
-            </p:spPr>
-            <p:style>
-              <a:lnRef idx="2">
-                <a:schemeClr val="accent1">
-                  <a:shade val="50000"/>
-                </a:schemeClr>
-              </a:lnRef>
-              <a:fillRef idx="1">
-                <a:schemeClr val="accent1"/>
-              </a:fillRef>
-              <a:effectRef idx="0">
-                <a:schemeClr val="accent1"/>
-              </a:effectRef>
-              <a:fontRef idx="minor">
-                <a:schemeClr val="lt1"/>
-              </a:fontRef>
-            </p:style>
-            <p:txBody>
-              <a:bodyPr rtlCol="0" anchor="ctr"/>
-              <a:lstStyle/>
-              <a:p>
-                <a:pPr algn="ctr"/>
-                <a:endParaRPr lang="en-US"/>
-              </a:p>
-            </p:txBody>
-          </p:sp>
-          <p:sp>
-            <p:nvSpPr>
-              <p:cNvPr id="70" name="Oval 69">
-                <a:extLst>
-                  <a:ext uri="{FF2B5EF4-FFF2-40B4-BE49-F238E27FC236}">
-                    <a16:creationId xmlns:a16="http://schemas.microsoft.com/office/drawing/2014/main" id="{5F7C570C-5FEF-514E-898A-563C3F9DEF8A}"/>
-                  </a:ext>
-                </a:extLst>
-              </p:cNvPr>
-              <p:cNvSpPr/>
-              <p:nvPr/>
-            </p:nvSpPr>
-            <p:spPr>
-              <a:xfrm>
-                <a:off x="8446957" y="4774366"/>
-                <a:ext cx="149902" cy="149901"/>
-              </a:xfrm>
-              <a:prstGeom prst="ellipse">
-                <a:avLst/>
-              </a:prstGeom>
-              <a:grpFill/>
-              <a:ln>
-                <a:solidFill>
-                  <a:srgbClr val="7030A0"/>
-                </a:solidFill>
-              </a:ln>
-            </p:spPr>
-            <p:style>
-              <a:lnRef idx="2">
-                <a:schemeClr val="accent1">
-                  <a:shade val="50000"/>
-                </a:schemeClr>
-              </a:lnRef>
-              <a:fillRef idx="1">
-                <a:schemeClr val="accent1"/>
-              </a:fillRef>
-              <a:effectRef idx="0">
-                <a:schemeClr val="accent1"/>
-              </a:effectRef>
-              <a:fontRef idx="minor">
-                <a:schemeClr val="lt1"/>
-              </a:fontRef>
-            </p:style>
-            <p:txBody>
-              <a:bodyPr rtlCol="0" anchor="ctr"/>
-              <a:lstStyle/>
-              <a:p>
-                <a:pPr algn="ctr"/>
-                <a:endParaRPr lang="en-US"/>
-              </a:p>
-            </p:txBody>
-          </p:sp>
-          <p:sp>
-            <p:nvSpPr>
-              <p:cNvPr id="71" name="Oval 70">
-                <a:extLst>
-                  <a:ext uri="{FF2B5EF4-FFF2-40B4-BE49-F238E27FC236}">
-                    <a16:creationId xmlns:a16="http://schemas.microsoft.com/office/drawing/2014/main" id="{F7ABC16B-BF0C-E040-B6ED-DEE57062114C}"/>
-                  </a:ext>
-                </a:extLst>
-              </p:cNvPr>
-              <p:cNvSpPr/>
-              <p:nvPr/>
-            </p:nvSpPr>
-            <p:spPr>
-              <a:xfrm>
-                <a:off x="6016053" y="3814998"/>
-                <a:ext cx="149902" cy="149901"/>
-              </a:xfrm>
-              <a:prstGeom prst="ellipse">
-                <a:avLst/>
-              </a:prstGeom>
-              <a:grpFill/>
-              <a:ln>
-                <a:solidFill>
-                  <a:srgbClr val="7030A0"/>
-                </a:solidFill>
-              </a:ln>
-            </p:spPr>
-            <p:style>
-              <a:lnRef idx="2">
-                <a:schemeClr val="accent1">
-                  <a:shade val="50000"/>
-                </a:schemeClr>
-              </a:lnRef>
-              <a:fillRef idx="1">
-                <a:schemeClr val="accent1"/>
-              </a:fillRef>
-              <a:effectRef idx="0">
-                <a:schemeClr val="accent1"/>
-              </a:effectRef>
-              <a:fontRef idx="minor">
-                <a:schemeClr val="lt1"/>
-              </a:fontRef>
-            </p:style>
-            <p:txBody>
-              <a:bodyPr rtlCol="0" anchor="ctr"/>
-              <a:lstStyle/>
-              <a:p>
-                <a:pPr algn="ctr"/>
-                <a:endParaRPr lang="en-US"/>
-              </a:p>
-            </p:txBody>
-          </p:sp>
-          <p:sp>
-            <p:nvSpPr>
-              <p:cNvPr id="80" name="Oval 79">
-                <a:extLst>
-                  <a:ext uri="{FF2B5EF4-FFF2-40B4-BE49-F238E27FC236}">
-                    <a16:creationId xmlns:a16="http://schemas.microsoft.com/office/drawing/2014/main" id="{C2EE5DAC-78E0-AE45-944A-03563605E901}"/>
-                  </a:ext>
-                </a:extLst>
-              </p:cNvPr>
-              <p:cNvSpPr/>
-              <p:nvPr/>
-            </p:nvSpPr>
-            <p:spPr>
-              <a:xfrm>
-                <a:off x="10860374" y="4624465"/>
-                <a:ext cx="149902" cy="149901"/>
-              </a:xfrm>
-              <a:prstGeom prst="ellipse">
-                <a:avLst/>
-              </a:prstGeom>
-              <a:grpFill/>
-              <a:ln>
-                <a:solidFill>
-                  <a:srgbClr val="7030A0"/>
-                </a:solidFill>
-              </a:ln>
-            </p:spPr>
-            <p:style>
-              <a:lnRef idx="2">
-                <a:schemeClr val="accent1">
-                  <a:shade val="50000"/>
-                </a:schemeClr>
-              </a:lnRef>
-              <a:fillRef idx="1">
-                <a:schemeClr val="accent1"/>
-              </a:fillRef>
-              <a:effectRef idx="0">
-                <a:schemeClr val="accent1"/>
-              </a:effectRef>
-              <a:fontRef idx="minor">
-                <a:schemeClr val="lt1"/>
-              </a:fontRef>
-            </p:style>
-            <p:txBody>
-              <a:bodyPr rtlCol="0" anchor="ctr"/>
-              <a:lstStyle/>
-              <a:p>
-                <a:pPr algn="ctr"/>
-                <a:endParaRPr lang="en-US"/>
-              </a:p>
-            </p:txBody>
-          </p:sp>
-          <p:sp>
-            <p:nvSpPr>
-              <p:cNvPr id="81" name="Oval 80">
-                <a:extLst>
-                  <a:ext uri="{FF2B5EF4-FFF2-40B4-BE49-F238E27FC236}">
-                    <a16:creationId xmlns:a16="http://schemas.microsoft.com/office/drawing/2014/main" id="{3F757F11-ABE5-1748-A2C4-108298160905}"/>
-                  </a:ext>
-                </a:extLst>
-              </p:cNvPr>
-              <p:cNvSpPr/>
-              <p:nvPr/>
-            </p:nvSpPr>
-            <p:spPr>
-              <a:xfrm>
-                <a:off x="7639987" y="5601324"/>
-                <a:ext cx="149902" cy="149901"/>
-              </a:xfrm>
-              <a:prstGeom prst="ellipse">
-                <a:avLst/>
-              </a:prstGeom>
-              <a:grpFill/>
-              <a:ln>
-                <a:solidFill>
-                  <a:srgbClr val="7030A0"/>
-                </a:solidFill>
-              </a:ln>
-            </p:spPr>
-            <p:style>
-              <a:lnRef idx="2">
-                <a:schemeClr val="accent1">
-                  <a:shade val="50000"/>
-                </a:schemeClr>
-              </a:lnRef>
-              <a:fillRef idx="1">
-                <a:schemeClr val="accent1"/>
-              </a:fillRef>
-              <a:effectRef idx="0">
-                <a:schemeClr val="accent1"/>
-              </a:effectRef>
-              <a:fontRef idx="minor">
-                <a:schemeClr val="lt1"/>
-              </a:fontRef>
-            </p:style>
-            <p:txBody>
-              <a:bodyPr rtlCol="0" anchor="ctr"/>
-              <a:lstStyle/>
-              <a:p>
-                <a:pPr algn="ctr"/>
-                <a:endParaRPr lang="en-US"/>
-              </a:p>
-            </p:txBody>
-          </p:sp>
-        </p:grpSp>
-        <p:grpSp>
-          <p:nvGrpSpPr>
-            <p:cNvPr id="45" name="Group 44">
-              <a:extLst>
-                <a:ext uri="{FF2B5EF4-FFF2-40B4-BE49-F238E27FC236}">
-                  <a16:creationId xmlns:a16="http://schemas.microsoft.com/office/drawing/2014/main" id="{D0ACCBB9-2E2A-6F4E-BF7A-BC0F4F29264F}"/>
-                </a:ext>
-              </a:extLst>
-            </p:cNvPr>
-            <p:cNvGrpSpPr/>
-            <p:nvPr/>
-          </p:nvGrpSpPr>
-          <p:grpSpPr>
-            <a:xfrm>
-              <a:off x="6212174" y="1656413"/>
-              <a:ext cx="4910528" cy="4094812"/>
-              <a:chOff x="6016053" y="2263514"/>
-              <a:chExt cx="4087318" cy="3487711"/>
-            </a:xfrm>
-            <a:solidFill>
-              <a:srgbClr val="FF0000"/>
-            </a:solidFill>
-          </p:grpSpPr>
-          <p:sp>
-            <p:nvSpPr>
-              <p:cNvPr id="49" name="Oval 48">
-                <a:extLst>
-                  <a:ext uri="{FF2B5EF4-FFF2-40B4-BE49-F238E27FC236}">
-                    <a16:creationId xmlns:a16="http://schemas.microsoft.com/office/drawing/2014/main" id="{D87A42C9-A420-374E-9E7A-582487750D08}"/>
-                  </a:ext>
-                </a:extLst>
-              </p:cNvPr>
-              <p:cNvSpPr/>
-              <p:nvPr/>
-            </p:nvSpPr>
-            <p:spPr>
-              <a:xfrm>
-                <a:off x="6625653" y="2263514"/>
-                <a:ext cx="149902" cy="149901"/>
-              </a:xfrm>
-              <a:prstGeom prst="ellipse">
-                <a:avLst/>
-              </a:prstGeom>
-              <a:grpFill/>
-              <a:ln>
-                <a:solidFill>
-                  <a:srgbClr val="FF0000"/>
-                </a:solidFill>
-              </a:ln>
-            </p:spPr>
-            <p:style>
-              <a:lnRef idx="2">
-                <a:schemeClr val="accent1">
-                  <a:shade val="50000"/>
-                </a:schemeClr>
-              </a:lnRef>
-              <a:fillRef idx="1">
-                <a:schemeClr val="accent1"/>
-              </a:fillRef>
-              <a:effectRef idx="0">
-                <a:schemeClr val="accent1"/>
-              </a:effectRef>
-              <a:fontRef idx="minor">
-                <a:schemeClr val="lt1"/>
-              </a:fontRef>
-            </p:style>
-            <p:txBody>
-              <a:bodyPr rtlCol="0" anchor="ctr"/>
-              <a:lstStyle/>
-              <a:p>
-                <a:pPr algn="ctr"/>
-                <a:endParaRPr lang="en-US"/>
-              </a:p>
-            </p:txBody>
-          </p:sp>
-          <p:sp>
-            <p:nvSpPr>
-              <p:cNvPr id="50" name="Oval 49">
-                <a:extLst>
-                  <a:ext uri="{FF2B5EF4-FFF2-40B4-BE49-F238E27FC236}">
-                    <a16:creationId xmlns:a16="http://schemas.microsoft.com/office/drawing/2014/main" id="{3E6AB123-8CBA-3B40-B3CD-3AEA9B89EF46}"/>
-                  </a:ext>
-                </a:extLst>
-              </p:cNvPr>
-              <p:cNvSpPr/>
-              <p:nvPr/>
-            </p:nvSpPr>
-            <p:spPr>
-              <a:xfrm>
-                <a:off x="7182787" y="5144124"/>
-                <a:ext cx="149902" cy="149901"/>
-              </a:xfrm>
-              <a:prstGeom prst="ellipse">
-                <a:avLst/>
-              </a:prstGeom>
-              <a:grpFill/>
-              <a:ln>
-                <a:solidFill>
-                  <a:srgbClr val="FF0000"/>
-                </a:solidFill>
-              </a:ln>
-            </p:spPr>
-            <p:style>
-              <a:lnRef idx="2">
-                <a:schemeClr val="accent1">
-                  <a:shade val="50000"/>
-                </a:schemeClr>
-              </a:lnRef>
-              <a:fillRef idx="1">
-                <a:schemeClr val="accent1"/>
-              </a:fillRef>
-              <a:effectRef idx="0">
-                <a:schemeClr val="accent1"/>
-              </a:effectRef>
-              <a:fontRef idx="minor">
-                <a:schemeClr val="lt1"/>
-              </a:fontRef>
-            </p:style>
-            <p:txBody>
-              <a:bodyPr rtlCol="0" anchor="ctr"/>
-              <a:lstStyle/>
-              <a:p>
-                <a:pPr algn="ctr"/>
-                <a:endParaRPr lang="en-US"/>
-              </a:p>
-            </p:txBody>
-          </p:sp>
-          <p:sp>
-            <p:nvSpPr>
-              <p:cNvPr id="51" name="Oval 50">
-                <a:extLst>
-                  <a:ext uri="{FF2B5EF4-FFF2-40B4-BE49-F238E27FC236}">
-                    <a16:creationId xmlns:a16="http://schemas.microsoft.com/office/drawing/2014/main" id="{3C5E64E1-1C29-024A-9D39-6D2EC44007DD}"/>
-                  </a:ext>
-                </a:extLst>
-              </p:cNvPr>
-              <p:cNvSpPr/>
-              <p:nvPr/>
-            </p:nvSpPr>
-            <p:spPr>
-              <a:xfrm>
-                <a:off x="8521908" y="2913087"/>
-                <a:ext cx="149902" cy="149901"/>
-              </a:xfrm>
-              <a:prstGeom prst="ellipse">
-                <a:avLst/>
-              </a:prstGeom>
-              <a:grpFill/>
-              <a:ln>
-                <a:solidFill>
-                  <a:srgbClr val="FF0000"/>
-                </a:solidFill>
-              </a:ln>
-            </p:spPr>
-            <p:style>
-              <a:lnRef idx="2">
-                <a:schemeClr val="accent1">
-                  <a:shade val="50000"/>
-                </a:schemeClr>
-              </a:lnRef>
-              <a:fillRef idx="1">
-                <a:schemeClr val="accent1"/>
-              </a:fillRef>
-              <a:effectRef idx="0">
-                <a:schemeClr val="accent1"/>
-              </a:effectRef>
-              <a:fontRef idx="minor">
-                <a:schemeClr val="lt1"/>
-              </a:fontRef>
-            </p:style>
-            <p:txBody>
-              <a:bodyPr rtlCol="0" anchor="ctr"/>
-              <a:lstStyle/>
-              <a:p>
-                <a:pPr algn="ctr"/>
-                <a:endParaRPr lang="en-US"/>
-              </a:p>
-            </p:txBody>
-          </p:sp>
-          <p:sp>
-            <p:nvSpPr>
-              <p:cNvPr id="52" name="Oval 51">
-                <a:extLst>
-                  <a:ext uri="{FF2B5EF4-FFF2-40B4-BE49-F238E27FC236}">
-                    <a16:creationId xmlns:a16="http://schemas.microsoft.com/office/drawing/2014/main" id="{50ED84D3-4977-C94D-8E78-28E8B97FFE7F}"/>
-                  </a:ext>
-                </a:extLst>
-              </p:cNvPr>
-              <p:cNvSpPr/>
-              <p:nvPr/>
-            </p:nvSpPr>
-            <p:spPr>
-              <a:xfrm>
-                <a:off x="6864246" y="3244729"/>
-                <a:ext cx="149902" cy="149901"/>
-              </a:xfrm>
-              <a:prstGeom prst="ellipse">
-                <a:avLst/>
-              </a:prstGeom>
-              <a:grpFill/>
-              <a:ln>
-                <a:solidFill>
-                  <a:srgbClr val="FF0000"/>
-                </a:solidFill>
-              </a:ln>
-            </p:spPr>
-            <p:style>
-              <a:lnRef idx="2">
-                <a:schemeClr val="accent1">
-                  <a:shade val="50000"/>
-                </a:schemeClr>
-              </a:lnRef>
-              <a:fillRef idx="1">
-                <a:schemeClr val="accent1"/>
-              </a:fillRef>
-              <a:effectRef idx="0">
-                <a:schemeClr val="accent1"/>
-              </a:effectRef>
-              <a:fontRef idx="minor">
-                <a:schemeClr val="lt1"/>
-              </a:fontRef>
-            </p:style>
-            <p:txBody>
-              <a:bodyPr rtlCol="0" anchor="ctr"/>
-              <a:lstStyle/>
-              <a:p>
-                <a:pPr algn="ctr"/>
-                <a:endParaRPr lang="en-US"/>
-              </a:p>
-            </p:txBody>
-          </p:sp>
-          <p:sp>
-            <p:nvSpPr>
-              <p:cNvPr id="54" name="Oval 53">
-                <a:extLst>
-                  <a:ext uri="{FF2B5EF4-FFF2-40B4-BE49-F238E27FC236}">
-                    <a16:creationId xmlns:a16="http://schemas.microsoft.com/office/drawing/2014/main" id="{EC489B30-8F1A-9846-9D0E-44F8290B6773}"/>
-                  </a:ext>
-                </a:extLst>
-              </p:cNvPr>
-              <p:cNvSpPr/>
-              <p:nvPr/>
-            </p:nvSpPr>
-            <p:spPr>
-              <a:xfrm>
-                <a:off x="7639987" y="5601324"/>
-                <a:ext cx="149902" cy="149901"/>
-              </a:xfrm>
-              <a:prstGeom prst="ellipse">
-                <a:avLst/>
-              </a:prstGeom>
-              <a:grpFill/>
-              <a:ln>
-                <a:solidFill>
-                  <a:srgbClr val="FF0000"/>
-                </a:solidFill>
-              </a:ln>
-            </p:spPr>
-            <p:style>
-              <a:lnRef idx="2">
-                <a:schemeClr val="accent1">
-                  <a:shade val="50000"/>
-                </a:schemeClr>
-              </a:lnRef>
-              <a:fillRef idx="1">
-                <a:schemeClr val="accent1"/>
-              </a:fillRef>
-              <a:effectRef idx="0">
-                <a:schemeClr val="accent1"/>
-              </a:effectRef>
-              <a:fontRef idx="minor">
-                <a:schemeClr val="lt1"/>
-              </a:fontRef>
-            </p:style>
-            <p:txBody>
-              <a:bodyPr rtlCol="0" anchor="ctr"/>
-              <a:lstStyle/>
-              <a:p>
-                <a:pPr algn="ctr"/>
-                <a:endParaRPr lang="en-US"/>
-              </a:p>
-            </p:txBody>
-          </p:sp>
-          <p:sp>
-            <p:nvSpPr>
-              <p:cNvPr id="55" name="Oval 54">
-                <a:extLst>
-                  <a:ext uri="{FF2B5EF4-FFF2-40B4-BE49-F238E27FC236}">
-                    <a16:creationId xmlns:a16="http://schemas.microsoft.com/office/drawing/2014/main" id="{CDDF3AE4-0079-914E-A2BE-D92682D40411}"/>
-                  </a:ext>
-                </a:extLst>
-              </p:cNvPr>
-              <p:cNvSpPr/>
-              <p:nvPr/>
-            </p:nvSpPr>
-            <p:spPr>
-              <a:xfrm>
-                <a:off x="9927236" y="2638265"/>
-                <a:ext cx="149902" cy="149901"/>
-              </a:xfrm>
-              <a:prstGeom prst="ellipse">
-                <a:avLst/>
-              </a:prstGeom>
-              <a:grpFill/>
-              <a:ln>
-                <a:solidFill>
-                  <a:srgbClr val="FF0000"/>
-                </a:solidFill>
-              </a:ln>
-            </p:spPr>
-            <p:style>
-              <a:lnRef idx="2">
-                <a:schemeClr val="accent1">
-                  <a:shade val="50000"/>
-                </a:schemeClr>
-              </a:lnRef>
-              <a:fillRef idx="1">
-                <a:schemeClr val="accent1"/>
-              </a:fillRef>
-              <a:effectRef idx="0">
-                <a:schemeClr val="accent1"/>
-              </a:effectRef>
-              <a:fontRef idx="minor">
-                <a:schemeClr val="lt1"/>
-              </a:fontRef>
-            </p:style>
-            <p:txBody>
-              <a:bodyPr rtlCol="0" anchor="ctr"/>
-              <a:lstStyle/>
-              <a:p>
-                <a:pPr algn="ctr"/>
-                <a:endParaRPr lang="en-US"/>
-              </a:p>
-            </p:txBody>
-          </p:sp>
-          <p:sp>
-            <p:nvSpPr>
-              <p:cNvPr id="56" name="Oval 55">
-                <a:extLst>
-                  <a:ext uri="{FF2B5EF4-FFF2-40B4-BE49-F238E27FC236}">
-                    <a16:creationId xmlns:a16="http://schemas.microsoft.com/office/drawing/2014/main" id="{1466E45F-9310-534F-BCEA-E11BC301C187}"/>
-                  </a:ext>
-                </a:extLst>
-              </p:cNvPr>
-              <p:cNvSpPr/>
-              <p:nvPr/>
-            </p:nvSpPr>
-            <p:spPr>
-              <a:xfrm>
-                <a:off x="8446957" y="4102945"/>
-                <a:ext cx="149902" cy="149901"/>
-              </a:xfrm>
-              <a:prstGeom prst="ellipse">
-                <a:avLst/>
-              </a:prstGeom>
-              <a:grpFill/>
-              <a:ln>
-                <a:solidFill>
-                  <a:srgbClr val="FF0000"/>
-                </a:solidFill>
-              </a:ln>
-            </p:spPr>
-            <p:style>
-              <a:lnRef idx="2">
-                <a:schemeClr val="accent1">
-                  <a:shade val="50000"/>
-                </a:schemeClr>
-              </a:lnRef>
-              <a:fillRef idx="1">
-                <a:schemeClr val="accent1"/>
-              </a:fillRef>
-              <a:effectRef idx="0">
-                <a:schemeClr val="accent1"/>
-              </a:effectRef>
-              <a:fontRef idx="minor">
-                <a:schemeClr val="lt1"/>
-              </a:fontRef>
-            </p:style>
-            <p:txBody>
-              <a:bodyPr rtlCol="0" anchor="ctr"/>
-              <a:lstStyle/>
-              <a:p>
-                <a:pPr algn="ctr"/>
-                <a:endParaRPr lang="en-US"/>
-              </a:p>
-            </p:txBody>
-          </p:sp>
-          <p:sp>
-            <p:nvSpPr>
-              <p:cNvPr id="58" name="Oval 57">
-                <a:extLst>
-                  <a:ext uri="{FF2B5EF4-FFF2-40B4-BE49-F238E27FC236}">
-                    <a16:creationId xmlns:a16="http://schemas.microsoft.com/office/drawing/2014/main" id="{662A3846-EB2F-FA4B-B728-FCCF037F2BCC}"/>
-                  </a:ext>
-                </a:extLst>
-              </p:cNvPr>
-              <p:cNvSpPr/>
-              <p:nvPr/>
-            </p:nvSpPr>
-            <p:spPr>
-              <a:xfrm>
-                <a:off x="6016053" y="3814998"/>
-                <a:ext cx="149902" cy="149901"/>
-              </a:xfrm>
-              <a:prstGeom prst="ellipse">
-                <a:avLst/>
-              </a:prstGeom>
-              <a:grpFill/>
-              <a:ln>
-                <a:solidFill>
-                  <a:srgbClr val="FF0000"/>
-                </a:solidFill>
-              </a:ln>
-            </p:spPr>
-            <p:style>
-              <a:lnRef idx="2">
-                <a:schemeClr val="accent1">
-                  <a:shade val="50000"/>
-                </a:schemeClr>
-              </a:lnRef>
-              <a:fillRef idx="1">
-                <a:schemeClr val="accent1"/>
-              </a:fillRef>
-              <a:effectRef idx="0">
-                <a:schemeClr val="accent1"/>
-              </a:effectRef>
-              <a:fontRef idx="minor">
-                <a:schemeClr val="lt1"/>
-              </a:fontRef>
-            </p:style>
-            <p:txBody>
-              <a:bodyPr rtlCol="0" anchor="ctr"/>
-              <a:lstStyle/>
-              <a:p>
-                <a:pPr algn="ctr"/>
-                <a:endParaRPr lang="en-US"/>
-              </a:p>
-            </p:txBody>
-          </p:sp>
-          <p:sp>
-            <p:nvSpPr>
-              <p:cNvPr id="60" name="Oval 59">
-                <a:extLst>
-                  <a:ext uri="{FF2B5EF4-FFF2-40B4-BE49-F238E27FC236}">
-                    <a16:creationId xmlns:a16="http://schemas.microsoft.com/office/drawing/2014/main" id="{C3DC340C-3C0A-7743-9C08-35C6494A0E5B}"/>
-                  </a:ext>
-                </a:extLst>
-              </p:cNvPr>
-              <p:cNvSpPr/>
-              <p:nvPr/>
-            </p:nvSpPr>
-            <p:spPr>
-              <a:xfrm>
-                <a:off x="9953469" y="4423108"/>
-                <a:ext cx="149902" cy="149901"/>
-              </a:xfrm>
-              <a:prstGeom prst="ellipse">
-                <a:avLst/>
-              </a:prstGeom>
-              <a:grpFill/>
-              <a:ln>
-                <a:solidFill>
-                  <a:srgbClr val="FF0000"/>
-                </a:solidFill>
-              </a:ln>
-            </p:spPr>
-            <p:style>
-              <a:lnRef idx="2">
-                <a:schemeClr val="accent1">
-                  <a:shade val="50000"/>
-                </a:schemeClr>
-              </a:lnRef>
-              <a:fillRef idx="1">
-                <a:schemeClr val="accent1"/>
-              </a:fillRef>
-              <a:effectRef idx="0">
-                <a:schemeClr val="accent1"/>
-              </a:effectRef>
-              <a:fontRef idx="minor">
-                <a:schemeClr val="lt1"/>
-              </a:fontRef>
-            </p:style>
-            <p:txBody>
-              <a:bodyPr rtlCol="0" anchor="ctr"/>
-              <a:lstStyle/>
-              <a:p>
-                <a:pPr algn="ctr"/>
-                <a:endParaRPr lang="en-US"/>
-              </a:p>
-            </p:txBody>
-          </p:sp>
-          <p:sp>
-            <p:nvSpPr>
-              <p:cNvPr id="63" name="Oval 62">
-                <a:extLst>
-                  <a:ext uri="{FF2B5EF4-FFF2-40B4-BE49-F238E27FC236}">
-                    <a16:creationId xmlns:a16="http://schemas.microsoft.com/office/drawing/2014/main" id="{448C3723-0BE2-0A4E-8CFD-C2D7D7FF3AB5}"/>
-                  </a:ext>
-                </a:extLst>
-              </p:cNvPr>
-              <p:cNvSpPr/>
-              <p:nvPr/>
-            </p:nvSpPr>
-            <p:spPr>
-              <a:xfrm>
-                <a:off x="7639987" y="5601324"/>
-                <a:ext cx="149902" cy="149901"/>
-              </a:xfrm>
-              <a:prstGeom prst="ellipse">
-                <a:avLst/>
-              </a:prstGeom>
-              <a:grpFill/>
-              <a:ln>
-                <a:solidFill>
-                  <a:srgbClr val="FF0000"/>
-                </a:solidFill>
-              </a:ln>
-            </p:spPr>
-            <p:style>
-              <a:lnRef idx="2">
-                <a:schemeClr val="accent1">
-                  <a:shade val="50000"/>
-                </a:schemeClr>
-              </a:lnRef>
-              <a:fillRef idx="1">
-                <a:schemeClr val="accent1"/>
-              </a:fillRef>
-              <a:effectRef idx="0">
-                <a:schemeClr val="accent1"/>
-              </a:effectRef>
-              <a:fontRef idx="minor">
-                <a:schemeClr val="lt1"/>
-              </a:fontRef>
-            </p:style>
-            <p:txBody>
-              <a:bodyPr rtlCol="0" anchor="ctr"/>
-              <a:lstStyle/>
-              <a:p>
-                <a:pPr algn="ctr"/>
-                <a:endParaRPr lang="en-US"/>
-              </a:p>
-            </p:txBody>
-          </p:sp>
-        </p:grpSp>
-        <p:cxnSp>
-          <p:nvCxnSpPr>
-            <p:cNvPr id="47" name="Straight Arrow Connector 46">
-              <a:extLst>
-                <a:ext uri="{FF2B5EF4-FFF2-40B4-BE49-F238E27FC236}">
-                  <a16:creationId xmlns:a16="http://schemas.microsoft.com/office/drawing/2014/main" id="{B45E93D3-6353-644A-B089-35406CEF0019}"/>
-                </a:ext>
-              </a:extLst>
-            </p:cNvPr>
-            <p:cNvCxnSpPr>
-              <a:cxnSpLocks/>
-            </p:cNvCxnSpPr>
-            <p:nvPr/>
-          </p:nvCxnSpPr>
-          <p:spPr>
-            <a:xfrm flipH="1">
-              <a:off x="5726243" y="2413415"/>
-              <a:ext cx="839450" cy="469962"/>
-            </a:xfrm>
-            <a:prstGeom prst="straightConnector1">
-              <a:avLst/>
-            </a:prstGeom>
-            <a:ln w="63500">
-              <a:solidFill>
-                <a:srgbClr val="7030A0"/>
-              </a:solidFill>
-              <a:tailEnd type="triangle"/>
-            </a:ln>
-          </p:spPr>
-          <p:style>
-            <a:lnRef idx="1">
-              <a:schemeClr val="accent1"/>
-            </a:lnRef>
-            <a:fillRef idx="0">
-              <a:schemeClr val="accent1"/>
-            </a:fillRef>
-            <a:effectRef idx="0">
-              <a:schemeClr val="accent1"/>
-            </a:effectRef>
-            <a:fontRef idx="minor">
-              <a:schemeClr val="tx1"/>
-            </a:fontRef>
-          </p:style>
-        </p:cxnSp>
       </p:grpSp>
-      <p:cxnSp>
-        <p:nvCxnSpPr>
-          <p:cNvPr id="35" name="Straight Arrow Connector 34">
-            <a:extLst>
-              <a:ext uri="{FF2B5EF4-FFF2-40B4-BE49-F238E27FC236}">
-                <a16:creationId xmlns:a16="http://schemas.microsoft.com/office/drawing/2014/main" id="{98E451C6-03F1-BA45-913C-67078C026BA8}"/>
-              </a:ext>
-            </a:extLst>
-          </p:cNvPr>
-          <p:cNvCxnSpPr>
-            <a:cxnSpLocks/>
-          </p:cNvCxnSpPr>
-          <p:nvPr/>
-        </p:nvCxnSpPr>
-        <p:spPr>
-          <a:xfrm>
-            <a:off x="5062817" y="3580243"/>
-            <a:ext cx="557114" cy="187085"/>
-          </a:xfrm>
-          <a:prstGeom prst="straightConnector1">
-            <a:avLst/>
-          </a:prstGeom>
-          <a:ln w="63500">
-            <a:solidFill>
-              <a:schemeClr val="accent1"/>
-            </a:solidFill>
-            <a:tailEnd type="triangle"/>
-          </a:ln>
-        </p:spPr>
-        <p:style>
-          <a:lnRef idx="1">
-            <a:schemeClr val="accent1"/>
-          </a:lnRef>
-          <a:fillRef idx="0">
-            <a:schemeClr val="accent1"/>
-          </a:fillRef>
-          <a:effectRef idx="0">
-            <a:schemeClr val="accent1"/>
-          </a:effectRef>
-          <a:fontRef idx="minor">
-            <a:schemeClr val="tx1"/>
-          </a:fontRef>
-        </p:style>
-      </p:cxnSp>
-      <p:sp>
-        <p:nvSpPr>
-          <p:cNvPr id="4" name="Left Arrow 3">
-            <a:extLst>
-              <a:ext uri="{FF2B5EF4-FFF2-40B4-BE49-F238E27FC236}">
-                <a16:creationId xmlns:a16="http://schemas.microsoft.com/office/drawing/2014/main" id="{6219A385-E132-1D4A-B625-FC7900D5F63C}"/>
-              </a:ext>
-            </a:extLst>
-          </p:cNvPr>
-          <p:cNvSpPr/>
-          <p:nvPr/>
-        </p:nvSpPr>
-        <p:spPr>
-          <a:xfrm>
-            <a:off x="4340386" y="4183438"/>
-            <a:ext cx="609566" cy="483425"/>
-          </a:xfrm>
-          <a:prstGeom prst="leftArrow">
-            <a:avLst/>
-          </a:prstGeom>
-        </p:spPr>
-        <p:style>
-          <a:lnRef idx="2">
-            <a:schemeClr val="accent1">
-              <a:shade val="50000"/>
-            </a:schemeClr>
-          </a:lnRef>
-          <a:fillRef idx="1">
-            <a:schemeClr val="accent1"/>
-          </a:fillRef>
-          <a:effectRef idx="0">
-            <a:schemeClr val="accent1"/>
-          </a:effectRef>
-          <a:fontRef idx="minor">
-            <a:schemeClr val="lt1"/>
-          </a:fontRef>
-        </p:style>
-        <p:txBody>
-          <a:bodyPr rtlCol="0" anchor="ctr"/>
-          <a:lstStyle/>
-          <a:p>
-            <a:pPr algn="ctr"/>
-            <a:endParaRPr lang="en-US"/>
-          </a:p>
-        </p:txBody>
-      </p:sp>
       <p:sp>
         <p:nvSpPr>
           <p:cNvPr id="32" name="TextBox 31">
@@ -6162,6 +6186,1552 @@
       </p:grpSpPr>
       <p:sp>
         <p:nvSpPr>
+          <p:cNvPr id="14" name="TextBox 13">
+            <a:extLst>
+              <a:ext uri="{FF2B5EF4-FFF2-40B4-BE49-F238E27FC236}">
+                <a16:creationId xmlns:a16="http://schemas.microsoft.com/office/drawing/2014/main" id="{C343D616-46A1-3B4D-AE72-967E282CF7BB}"/>
+              </a:ext>
+            </a:extLst>
+          </p:cNvPr>
+          <p:cNvSpPr txBox="1"/>
+          <p:nvPr/>
+        </p:nvSpPr>
+        <p:spPr>
+          <a:xfrm>
+            <a:off x="6096000" y="965712"/>
+            <a:ext cx="6057229" cy="1200329"/>
+          </a:xfrm>
+          <a:prstGeom prst="rect">
+            <a:avLst/>
+          </a:prstGeom>
+          <a:noFill/>
+        </p:spPr>
+        <p:txBody>
+          <a:bodyPr wrap="square" rtlCol="0">
+            <a:spAutoFit/>
+          </a:bodyPr>
+          <a:lstStyle/>
+          <a:p>
+            <a:r>
+              <a:rPr lang="en-US" sz="2400" dirty="0"/>
+              <a:t>This marks a constant-temperature slice (“</a:t>
+            </a:r>
+            <a:r>
+              <a:rPr lang="en-US" sz="2400" b="1" dirty="0"/>
+              <a:t>isotherm</a:t>
+            </a:r>
+            <a:r>
+              <a:rPr lang="en-US" sz="2400" dirty="0"/>
+              <a:t>”) through </a:t>
+            </a:r>
+            <a:r>
+              <a:rPr lang="en-US" sz="2400" i="1" dirty="0"/>
+              <a:t>P(T,V). </a:t>
+            </a:r>
+            <a:r>
+              <a:rPr lang="en-US" sz="2400" dirty="0"/>
+              <a:t>In this case, the isotherm temperature is </a:t>
+            </a:r>
+            <a:r>
+              <a:rPr lang="en-US" sz="2400" dirty="0">
+                <a:solidFill>
+                  <a:srgbClr val="FF0000"/>
+                </a:solidFill>
+              </a:rPr>
+              <a:t>350 K</a:t>
+            </a:r>
+            <a:r>
+              <a:rPr lang="en-US" sz="2400" dirty="0"/>
+              <a:t>.</a:t>
+            </a:r>
+          </a:p>
+        </p:txBody>
+      </p:sp>
+      <p:sp>
+        <p:nvSpPr>
+          <p:cNvPr id="27" name="TextBox 26">
+            <a:extLst>
+              <a:ext uri="{FF2B5EF4-FFF2-40B4-BE49-F238E27FC236}">
+                <a16:creationId xmlns:a16="http://schemas.microsoft.com/office/drawing/2014/main" id="{B7C40E99-40E1-8243-B2B0-3050659C7564}"/>
+              </a:ext>
+            </a:extLst>
+          </p:cNvPr>
+          <p:cNvSpPr txBox="1"/>
+          <p:nvPr/>
+        </p:nvSpPr>
+        <p:spPr>
+          <a:xfrm>
+            <a:off x="688678" y="377142"/>
+            <a:ext cx="4700186" cy="830997"/>
+          </a:xfrm>
+          <a:prstGeom prst="rect">
+            <a:avLst/>
+          </a:prstGeom>
+          <a:noFill/>
+        </p:spPr>
+        <p:txBody>
+          <a:bodyPr wrap="square" rtlCol="0">
+            <a:spAutoFit/>
+          </a:bodyPr>
+          <a:lstStyle/>
+          <a:p>
+            <a:r>
+              <a:rPr lang="en-US" sz="2400" b="1" dirty="0"/>
+              <a:t>Isotherm: a slices through a thermodynamic surface</a:t>
+            </a:r>
+          </a:p>
+        </p:txBody>
+      </p:sp>
+      <p:pic>
+        <p:nvPicPr>
+          <p:cNvPr id="19" name="Picture 18">
+            <a:extLst>
+              <a:ext uri="{FF2B5EF4-FFF2-40B4-BE49-F238E27FC236}">
+                <a16:creationId xmlns:a16="http://schemas.microsoft.com/office/drawing/2014/main" id="{A2334EC2-B195-804D-89E6-FA40FB35C3A1}"/>
+              </a:ext>
+            </a:extLst>
+          </p:cNvPr>
+          <p:cNvPicPr>
+            <a:picLocks noChangeAspect="1"/>
+          </p:cNvPicPr>
+          <p:nvPr/>
+        </p:nvPicPr>
+        <p:blipFill>
+          <a:blip r:embed="rId2"/>
+          <a:stretch>
+            <a:fillRect/>
+          </a:stretch>
+        </p:blipFill>
+        <p:spPr>
+          <a:xfrm>
+            <a:off x="170208" y="1335045"/>
+            <a:ext cx="5737126" cy="4524315"/>
+          </a:xfrm>
+          <a:prstGeom prst="rect">
+            <a:avLst/>
+          </a:prstGeom>
+        </p:spPr>
+      </p:pic>
+      <p:cxnSp>
+        <p:nvCxnSpPr>
+          <p:cNvPr id="3" name="Straight Connector 2">
+            <a:extLst>
+              <a:ext uri="{FF2B5EF4-FFF2-40B4-BE49-F238E27FC236}">
+                <a16:creationId xmlns:a16="http://schemas.microsoft.com/office/drawing/2014/main" id="{6407B16E-9BA6-C9D7-0117-BDC4253622B8}"/>
+              </a:ext>
+            </a:extLst>
+          </p:cNvPr>
+          <p:cNvCxnSpPr/>
+          <p:nvPr/>
+        </p:nvCxnSpPr>
+        <p:spPr>
+          <a:xfrm>
+            <a:off x="1433015" y="2456597"/>
+            <a:ext cx="0" cy="436728"/>
+          </a:xfrm>
+          <a:prstGeom prst="line">
+            <a:avLst/>
+          </a:prstGeom>
+        </p:spPr>
+        <p:style>
+          <a:lnRef idx="1">
+            <a:schemeClr val="accent1"/>
+          </a:lnRef>
+          <a:fillRef idx="0">
+            <a:schemeClr val="accent1"/>
+          </a:fillRef>
+          <a:effectRef idx="0">
+            <a:schemeClr val="accent1"/>
+          </a:effectRef>
+          <a:fontRef idx="minor">
+            <a:schemeClr val="tx1"/>
+          </a:fontRef>
+        </p:style>
+      </p:cxnSp>
+      <p:sp>
+        <p:nvSpPr>
+          <p:cNvPr id="5" name="Freeform 4">
+            <a:extLst>
+              <a:ext uri="{FF2B5EF4-FFF2-40B4-BE49-F238E27FC236}">
+                <a16:creationId xmlns:a16="http://schemas.microsoft.com/office/drawing/2014/main" id="{0E8CA51B-CEBE-1C8C-1D46-1D2ED5CFE48A}"/>
+              </a:ext>
+            </a:extLst>
+          </p:cNvPr>
+          <p:cNvSpPr/>
+          <p:nvPr/>
+        </p:nvSpPr>
+        <p:spPr>
+          <a:xfrm>
+            <a:off x="1828801" y="2579427"/>
+            <a:ext cx="1842448" cy="2210935"/>
+          </a:xfrm>
+          <a:custGeom>
+            <a:avLst/>
+            <a:gdLst>
+              <a:gd name="connsiteX0" fmla="*/ 0 w 1842448"/>
+              <a:gd name="connsiteY0" fmla="*/ 0 h 2470245"/>
+              <a:gd name="connsiteX1" fmla="*/ 13648 w 1842448"/>
+              <a:gd name="connsiteY1" fmla="*/ 286603 h 2470245"/>
+              <a:gd name="connsiteX2" fmla="*/ 40943 w 1842448"/>
+              <a:gd name="connsiteY2" fmla="*/ 559558 h 2470245"/>
+              <a:gd name="connsiteX3" fmla="*/ 68239 w 1842448"/>
+              <a:gd name="connsiteY3" fmla="*/ 900752 h 2470245"/>
+              <a:gd name="connsiteX4" fmla="*/ 109182 w 1842448"/>
+              <a:gd name="connsiteY4" fmla="*/ 1201003 h 2470245"/>
+              <a:gd name="connsiteX5" fmla="*/ 163773 w 1842448"/>
+              <a:gd name="connsiteY5" fmla="*/ 1473958 h 2470245"/>
+              <a:gd name="connsiteX6" fmla="*/ 286603 w 1842448"/>
+              <a:gd name="connsiteY6" fmla="*/ 1746913 h 2470245"/>
+              <a:gd name="connsiteX7" fmla="*/ 573206 w 1842448"/>
+              <a:gd name="connsiteY7" fmla="*/ 1965277 h 2470245"/>
+              <a:gd name="connsiteX8" fmla="*/ 928048 w 1842448"/>
+              <a:gd name="connsiteY8" fmla="*/ 2115403 h 2470245"/>
+              <a:gd name="connsiteX9" fmla="*/ 1269242 w 1842448"/>
+              <a:gd name="connsiteY9" fmla="*/ 2251880 h 2470245"/>
+              <a:gd name="connsiteX10" fmla="*/ 1514902 w 1842448"/>
+              <a:gd name="connsiteY10" fmla="*/ 2347415 h 2470245"/>
+              <a:gd name="connsiteX11" fmla="*/ 1842448 w 1842448"/>
+              <a:gd name="connsiteY11" fmla="*/ 2470245 h 2470245"/>
+            </a:gdLst>
+            <a:ahLst/>
+            <a:cxnLst>
+              <a:cxn ang="0">
+                <a:pos x="connsiteX0" y="connsiteY0"/>
+              </a:cxn>
+              <a:cxn ang="0">
+                <a:pos x="connsiteX1" y="connsiteY1"/>
+              </a:cxn>
+              <a:cxn ang="0">
+                <a:pos x="connsiteX2" y="connsiteY2"/>
+              </a:cxn>
+              <a:cxn ang="0">
+                <a:pos x="connsiteX3" y="connsiteY3"/>
+              </a:cxn>
+              <a:cxn ang="0">
+                <a:pos x="connsiteX4" y="connsiteY4"/>
+              </a:cxn>
+              <a:cxn ang="0">
+                <a:pos x="connsiteX5" y="connsiteY5"/>
+              </a:cxn>
+              <a:cxn ang="0">
+                <a:pos x="connsiteX6" y="connsiteY6"/>
+              </a:cxn>
+              <a:cxn ang="0">
+                <a:pos x="connsiteX7" y="connsiteY7"/>
+              </a:cxn>
+              <a:cxn ang="0">
+                <a:pos x="connsiteX8" y="connsiteY8"/>
+              </a:cxn>
+              <a:cxn ang="0">
+                <a:pos x="connsiteX9" y="connsiteY9"/>
+              </a:cxn>
+              <a:cxn ang="0">
+                <a:pos x="connsiteX10" y="connsiteY10"/>
+              </a:cxn>
+              <a:cxn ang="0">
+                <a:pos x="connsiteX11" y="connsiteY11"/>
+              </a:cxn>
+            </a:cxnLst>
+            <a:rect l="l" t="t" r="r" b="b"/>
+            <a:pathLst>
+              <a:path w="1842448" h="2470245">
+                <a:moveTo>
+                  <a:pt x="0" y="0"/>
+                </a:moveTo>
+                <a:cubicBezTo>
+                  <a:pt x="3412" y="96671"/>
+                  <a:pt x="6824" y="193343"/>
+                  <a:pt x="13648" y="286603"/>
+                </a:cubicBezTo>
+                <a:cubicBezTo>
+                  <a:pt x="20472" y="379863"/>
+                  <a:pt x="31845" y="457200"/>
+                  <a:pt x="40943" y="559558"/>
+                </a:cubicBezTo>
+                <a:cubicBezTo>
+                  <a:pt x="50042" y="661916"/>
+                  <a:pt x="56866" y="793845"/>
+                  <a:pt x="68239" y="900752"/>
+                </a:cubicBezTo>
+                <a:cubicBezTo>
+                  <a:pt x="79612" y="1007659"/>
+                  <a:pt x="93260" y="1105469"/>
+                  <a:pt x="109182" y="1201003"/>
+                </a:cubicBezTo>
+                <a:cubicBezTo>
+                  <a:pt x="125104" y="1296537"/>
+                  <a:pt x="134203" y="1382973"/>
+                  <a:pt x="163773" y="1473958"/>
+                </a:cubicBezTo>
+                <a:cubicBezTo>
+                  <a:pt x="193343" y="1564943"/>
+                  <a:pt x="218364" y="1665027"/>
+                  <a:pt x="286603" y="1746913"/>
+                </a:cubicBezTo>
+                <a:cubicBezTo>
+                  <a:pt x="354842" y="1828799"/>
+                  <a:pt x="466299" y="1903862"/>
+                  <a:pt x="573206" y="1965277"/>
+                </a:cubicBezTo>
+                <a:cubicBezTo>
+                  <a:pt x="680114" y="2026692"/>
+                  <a:pt x="812042" y="2067636"/>
+                  <a:pt x="928048" y="2115403"/>
+                </a:cubicBezTo>
+                <a:cubicBezTo>
+                  <a:pt x="1044054" y="2163170"/>
+                  <a:pt x="1269242" y="2251880"/>
+                  <a:pt x="1269242" y="2251880"/>
+                </a:cubicBezTo>
+                <a:lnTo>
+                  <a:pt x="1514902" y="2347415"/>
+                </a:lnTo>
+                <a:lnTo>
+                  <a:pt x="1842448" y="2470245"/>
+                </a:lnTo>
+              </a:path>
+            </a:pathLst>
+          </a:custGeom>
+          <a:ln w="127000">
+            <a:solidFill>
+              <a:srgbClr val="FF0000"/>
+            </a:solidFill>
+          </a:ln>
+        </p:spPr>
+        <p:style>
+          <a:lnRef idx="3">
+            <a:schemeClr val="dk1"/>
+          </a:lnRef>
+          <a:fillRef idx="0">
+            <a:schemeClr val="dk1"/>
+          </a:fillRef>
+          <a:effectRef idx="2">
+            <a:schemeClr val="dk1"/>
+          </a:effectRef>
+          <a:fontRef idx="minor">
+            <a:schemeClr val="tx1"/>
+          </a:fontRef>
+        </p:style>
+        <p:txBody>
+          <a:bodyPr rtlCol="0" anchor="ctr"/>
+          <a:lstStyle/>
+          <a:p>
+            <a:pPr algn="ctr"/>
+            <a:endParaRPr lang="en-US"/>
+          </a:p>
+        </p:txBody>
+      </p:sp>
+    </p:spTree>
+    <p:extLst>
+      <p:ext uri="{BB962C8B-B14F-4D97-AF65-F5344CB8AC3E}">
+        <p14:creationId xmlns:p14="http://schemas.microsoft.com/office/powerpoint/2010/main" val="2230046631"/>
+      </p:ext>
+    </p:extLst>
+  </p:cSld>
+  <p:clrMapOvr>
+    <a:masterClrMapping/>
+  </p:clrMapOvr>
+</p:sld>
+</file>
+
+<file path=ppt/slides/slide14.xml><?xml version="1.0" encoding="utf-8"?>
+<p:sld xmlns:a="http://schemas.openxmlformats.org/drawingml/2006/main" xmlns:r="http://schemas.openxmlformats.org/officeDocument/2006/relationships" xmlns:p="http://schemas.openxmlformats.org/presentationml/2006/main">
+  <p:cSld>
+    <p:spTree>
+      <p:nvGrpSpPr>
+        <p:cNvPr id="1" name=""/>
+        <p:cNvGrpSpPr/>
+        <p:nvPr/>
+      </p:nvGrpSpPr>
+      <p:grpSpPr>
+        <a:xfrm>
+          <a:off x="0" y="0"/>
+          <a:ext cx="0" cy="0"/>
+          <a:chOff x="0" y="0"/>
+          <a:chExt cx="0" cy="0"/>
+        </a:xfrm>
+      </p:grpSpPr>
+      <p:sp>
+        <p:nvSpPr>
+          <p:cNvPr id="14" name="TextBox 13">
+            <a:extLst>
+              <a:ext uri="{FF2B5EF4-FFF2-40B4-BE49-F238E27FC236}">
+                <a16:creationId xmlns:a16="http://schemas.microsoft.com/office/drawing/2014/main" id="{C343D616-46A1-3B4D-AE72-967E282CF7BB}"/>
+              </a:ext>
+            </a:extLst>
+          </p:cNvPr>
+          <p:cNvSpPr txBox="1"/>
+          <p:nvPr/>
+        </p:nvSpPr>
+        <p:spPr>
+          <a:xfrm>
+            <a:off x="6096000" y="965712"/>
+            <a:ext cx="6057229" cy="1938992"/>
+          </a:xfrm>
+          <a:prstGeom prst="rect">
+            <a:avLst/>
+          </a:prstGeom>
+          <a:noFill/>
+        </p:spPr>
+        <p:txBody>
+          <a:bodyPr wrap="square" rtlCol="0">
+            <a:spAutoFit/>
+          </a:bodyPr>
+          <a:lstStyle/>
+          <a:p>
+            <a:r>
+              <a:rPr lang="en-US" sz="2400" dirty="0"/>
+              <a:t>This marks a constant-temperature slice (“</a:t>
+            </a:r>
+            <a:r>
+              <a:rPr lang="en-US" sz="2400" b="1" dirty="0"/>
+              <a:t>isotherm</a:t>
+            </a:r>
+            <a:r>
+              <a:rPr lang="en-US" sz="2400" dirty="0"/>
+              <a:t>”) through </a:t>
+            </a:r>
+            <a:r>
+              <a:rPr lang="en-US" sz="2400" i="1" dirty="0"/>
+              <a:t>P(T,V). </a:t>
+            </a:r>
+            <a:r>
+              <a:rPr lang="en-US" sz="2400" dirty="0"/>
+              <a:t>In this case, the isotherm temperature is </a:t>
+            </a:r>
+            <a:r>
+              <a:rPr lang="en-US" sz="2400" dirty="0">
+                <a:solidFill>
+                  <a:srgbClr val="FF0000"/>
+                </a:solidFill>
+              </a:rPr>
+              <a:t>350 K</a:t>
+            </a:r>
+            <a:r>
+              <a:rPr lang="en-US" sz="2400" dirty="0"/>
+              <a:t>.</a:t>
+            </a:r>
+          </a:p>
+          <a:p>
+            <a:endParaRPr lang="en-US" sz="2400" dirty="0"/>
+          </a:p>
+          <a:p>
+            <a:r>
+              <a:rPr lang="en-US" sz="2400" dirty="0"/>
+              <a:t>This isotherm is colder, at </a:t>
+            </a:r>
+            <a:r>
+              <a:rPr lang="en-US" sz="2400" dirty="0">
+                <a:solidFill>
+                  <a:schemeClr val="accent1"/>
+                </a:solidFill>
+              </a:rPr>
+              <a:t>300 K</a:t>
+            </a:r>
+            <a:r>
+              <a:rPr lang="en-US" sz="2400" dirty="0"/>
+              <a:t>.</a:t>
+            </a:r>
+          </a:p>
+        </p:txBody>
+      </p:sp>
+      <p:sp>
+        <p:nvSpPr>
+          <p:cNvPr id="27" name="TextBox 26">
+            <a:extLst>
+              <a:ext uri="{FF2B5EF4-FFF2-40B4-BE49-F238E27FC236}">
+                <a16:creationId xmlns:a16="http://schemas.microsoft.com/office/drawing/2014/main" id="{B7C40E99-40E1-8243-B2B0-3050659C7564}"/>
+              </a:ext>
+            </a:extLst>
+          </p:cNvPr>
+          <p:cNvSpPr txBox="1"/>
+          <p:nvPr/>
+        </p:nvSpPr>
+        <p:spPr>
+          <a:xfrm>
+            <a:off x="688678" y="377142"/>
+            <a:ext cx="4700186" cy="830997"/>
+          </a:xfrm>
+          <a:prstGeom prst="rect">
+            <a:avLst/>
+          </a:prstGeom>
+          <a:noFill/>
+        </p:spPr>
+        <p:txBody>
+          <a:bodyPr wrap="square" rtlCol="0">
+            <a:spAutoFit/>
+          </a:bodyPr>
+          <a:lstStyle/>
+          <a:p>
+            <a:r>
+              <a:rPr lang="en-US" sz="2400" b="1" dirty="0"/>
+              <a:t>Isotherm: a slices through a thermodynamic surface</a:t>
+            </a:r>
+          </a:p>
+        </p:txBody>
+      </p:sp>
+      <p:pic>
+        <p:nvPicPr>
+          <p:cNvPr id="19" name="Picture 18">
+            <a:extLst>
+              <a:ext uri="{FF2B5EF4-FFF2-40B4-BE49-F238E27FC236}">
+                <a16:creationId xmlns:a16="http://schemas.microsoft.com/office/drawing/2014/main" id="{A2334EC2-B195-804D-89E6-FA40FB35C3A1}"/>
+              </a:ext>
+            </a:extLst>
+          </p:cNvPr>
+          <p:cNvPicPr>
+            <a:picLocks noChangeAspect="1"/>
+          </p:cNvPicPr>
+          <p:nvPr/>
+        </p:nvPicPr>
+        <p:blipFill>
+          <a:blip r:embed="rId2"/>
+          <a:stretch>
+            <a:fillRect/>
+          </a:stretch>
+        </p:blipFill>
+        <p:spPr>
+          <a:xfrm>
+            <a:off x="170208" y="1335045"/>
+            <a:ext cx="5737126" cy="4524315"/>
+          </a:xfrm>
+          <a:prstGeom prst="rect">
+            <a:avLst/>
+          </a:prstGeom>
+        </p:spPr>
+      </p:pic>
+      <p:cxnSp>
+        <p:nvCxnSpPr>
+          <p:cNvPr id="3" name="Straight Connector 2">
+            <a:extLst>
+              <a:ext uri="{FF2B5EF4-FFF2-40B4-BE49-F238E27FC236}">
+                <a16:creationId xmlns:a16="http://schemas.microsoft.com/office/drawing/2014/main" id="{6407B16E-9BA6-C9D7-0117-BDC4253622B8}"/>
+              </a:ext>
+            </a:extLst>
+          </p:cNvPr>
+          <p:cNvCxnSpPr/>
+          <p:nvPr/>
+        </p:nvCxnSpPr>
+        <p:spPr>
+          <a:xfrm>
+            <a:off x="1433015" y="2456597"/>
+            <a:ext cx="0" cy="436728"/>
+          </a:xfrm>
+          <a:prstGeom prst="line">
+            <a:avLst/>
+          </a:prstGeom>
+        </p:spPr>
+        <p:style>
+          <a:lnRef idx="1">
+            <a:schemeClr val="accent1"/>
+          </a:lnRef>
+          <a:fillRef idx="0">
+            <a:schemeClr val="accent1"/>
+          </a:fillRef>
+          <a:effectRef idx="0">
+            <a:schemeClr val="accent1"/>
+          </a:effectRef>
+          <a:fontRef idx="minor">
+            <a:schemeClr val="tx1"/>
+          </a:fontRef>
+        </p:style>
+      </p:cxnSp>
+      <p:sp>
+        <p:nvSpPr>
+          <p:cNvPr id="4" name="Freeform 3">
+            <a:extLst>
+              <a:ext uri="{FF2B5EF4-FFF2-40B4-BE49-F238E27FC236}">
+                <a16:creationId xmlns:a16="http://schemas.microsoft.com/office/drawing/2014/main" id="{55A78C68-407D-0878-690A-753EC53FEBAB}"/>
+              </a:ext>
+            </a:extLst>
+          </p:cNvPr>
+          <p:cNvSpPr/>
+          <p:nvPr/>
+        </p:nvSpPr>
+        <p:spPr>
+          <a:xfrm>
+            <a:off x="1828801" y="2579427"/>
+            <a:ext cx="1842448" cy="2210935"/>
+          </a:xfrm>
+          <a:custGeom>
+            <a:avLst/>
+            <a:gdLst>
+              <a:gd name="connsiteX0" fmla="*/ 0 w 1842448"/>
+              <a:gd name="connsiteY0" fmla="*/ 0 h 2470245"/>
+              <a:gd name="connsiteX1" fmla="*/ 13648 w 1842448"/>
+              <a:gd name="connsiteY1" fmla="*/ 286603 h 2470245"/>
+              <a:gd name="connsiteX2" fmla="*/ 40943 w 1842448"/>
+              <a:gd name="connsiteY2" fmla="*/ 559558 h 2470245"/>
+              <a:gd name="connsiteX3" fmla="*/ 68239 w 1842448"/>
+              <a:gd name="connsiteY3" fmla="*/ 900752 h 2470245"/>
+              <a:gd name="connsiteX4" fmla="*/ 109182 w 1842448"/>
+              <a:gd name="connsiteY4" fmla="*/ 1201003 h 2470245"/>
+              <a:gd name="connsiteX5" fmla="*/ 163773 w 1842448"/>
+              <a:gd name="connsiteY5" fmla="*/ 1473958 h 2470245"/>
+              <a:gd name="connsiteX6" fmla="*/ 286603 w 1842448"/>
+              <a:gd name="connsiteY6" fmla="*/ 1746913 h 2470245"/>
+              <a:gd name="connsiteX7" fmla="*/ 573206 w 1842448"/>
+              <a:gd name="connsiteY7" fmla="*/ 1965277 h 2470245"/>
+              <a:gd name="connsiteX8" fmla="*/ 928048 w 1842448"/>
+              <a:gd name="connsiteY8" fmla="*/ 2115403 h 2470245"/>
+              <a:gd name="connsiteX9" fmla="*/ 1269242 w 1842448"/>
+              <a:gd name="connsiteY9" fmla="*/ 2251880 h 2470245"/>
+              <a:gd name="connsiteX10" fmla="*/ 1514902 w 1842448"/>
+              <a:gd name="connsiteY10" fmla="*/ 2347415 h 2470245"/>
+              <a:gd name="connsiteX11" fmla="*/ 1842448 w 1842448"/>
+              <a:gd name="connsiteY11" fmla="*/ 2470245 h 2470245"/>
+            </a:gdLst>
+            <a:ahLst/>
+            <a:cxnLst>
+              <a:cxn ang="0">
+                <a:pos x="connsiteX0" y="connsiteY0"/>
+              </a:cxn>
+              <a:cxn ang="0">
+                <a:pos x="connsiteX1" y="connsiteY1"/>
+              </a:cxn>
+              <a:cxn ang="0">
+                <a:pos x="connsiteX2" y="connsiteY2"/>
+              </a:cxn>
+              <a:cxn ang="0">
+                <a:pos x="connsiteX3" y="connsiteY3"/>
+              </a:cxn>
+              <a:cxn ang="0">
+                <a:pos x="connsiteX4" y="connsiteY4"/>
+              </a:cxn>
+              <a:cxn ang="0">
+                <a:pos x="connsiteX5" y="connsiteY5"/>
+              </a:cxn>
+              <a:cxn ang="0">
+                <a:pos x="connsiteX6" y="connsiteY6"/>
+              </a:cxn>
+              <a:cxn ang="0">
+                <a:pos x="connsiteX7" y="connsiteY7"/>
+              </a:cxn>
+              <a:cxn ang="0">
+                <a:pos x="connsiteX8" y="connsiteY8"/>
+              </a:cxn>
+              <a:cxn ang="0">
+                <a:pos x="connsiteX9" y="connsiteY9"/>
+              </a:cxn>
+              <a:cxn ang="0">
+                <a:pos x="connsiteX10" y="connsiteY10"/>
+              </a:cxn>
+              <a:cxn ang="0">
+                <a:pos x="connsiteX11" y="connsiteY11"/>
+              </a:cxn>
+            </a:cxnLst>
+            <a:rect l="l" t="t" r="r" b="b"/>
+            <a:pathLst>
+              <a:path w="1842448" h="2470245">
+                <a:moveTo>
+                  <a:pt x="0" y="0"/>
+                </a:moveTo>
+                <a:cubicBezTo>
+                  <a:pt x="3412" y="96671"/>
+                  <a:pt x="6824" y="193343"/>
+                  <a:pt x="13648" y="286603"/>
+                </a:cubicBezTo>
+                <a:cubicBezTo>
+                  <a:pt x="20472" y="379863"/>
+                  <a:pt x="31845" y="457200"/>
+                  <a:pt x="40943" y="559558"/>
+                </a:cubicBezTo>
+                <a:cubicBezTo>
+                  <a:pt x="50042" y="661916"/>
+                  <a:pt x="56866" y="793845"/>
+                  <a:pt x="68239" y="900752"/>
+                </a:cubicBezTo>
+                <a:cubicBezTo>
+                  <a:pt x="79612" y="1007659"/>
+                  <a:pt x="93260" y="1105469"/>
+                  <a:pt x="109182" y="1201003"/>
+                </a:cubicBezTo>
+                <a:cubicBezTo>
+                  <a:pt x="125104" y="1296537"/>
+                  <a:pt x="134203" y="1382973"/>
+                  <a:pt x="163773" y="1473958"/>
+                </a:cubicBezTo>
+                <a:cubicBezTo>
+                  <a:pt x="193343" y="1564943"/>
+                  <a:pt x="218364" y="1665027"/>
+                  <a:pt x="286603" y="1746913"/>
+                </a:cubicBezTo>
+                <a:cubicBezTo>
+                  <a:pt x="354842" y="1828799"/>
+                  <a:pt x="466299" y="1903862"/>
+                  <a:pt x="573206" y="1965277"/>
+                </a:cubicBezTo>
+                <a:cubicBezTo>
+                  <a:pt x="680114" y="2026692"/>
+                  <a:pt x="812042" y="2067636"/>
+                  <a:pt x="928048" y="2115403"/>
+                </a:cubicBezTo>
+                <a:cubicBezTo>
+                  <a:pt x="1044054" y="2163170"/>
+                  <a:pt x="1269242" y="2251880"/>
+                  <a:pt x="1269242" y="2251880"/>
+                </a:cubicBezTo>
+                <a:lnTo>
+                  <a:pt x="1514902" y="2347415"/>
+                </a:lnTo>
+                <a:lnTo>
+                  <a:pt x="1842448" y="2470245"/>
+                </a:lnTo>
+              </a:path>
+            </a:pathLst>
+          </a:custGeom>
+          <a:ln w="127000">
+            <a:solidFill>
+              <a:srgbClr val="FF0000"/>
+            </a:solidFill>
+          </a:ln>
+        </p:spPr>
+        <p:style>
+          <a:lnRef idx="3">
+            <a:schemeClr val="dk1"/>
+          </a:lnRef>
+          <a:fillRef idx="0">
+            <a:schemeClr val="dk1"/>
+          </a:fillRef>
+          <a:effectRef idx="2">
+            <a:schemeClr val="dk1"/>
+          </a:effectRef>
+          <a:fontRef idx="minor">
+            <a:schemeClr val="tx1"/>
+          </a:fontRef>
+        </p:style>
+        <p:txBody>
+          <a:bodyPr rtlCol="0" anchor="ctr"/>
+          <a:lstStyle/>
+          <a:p>
+            <a:pPr algn="ctr"/>
+            <a:endParaRPr lang="en-US"/>
+          </a:p>
+        </p:txBody>
+      </p:sp>
+      <p:sp>
+        <p:nvSpPr>
+          <p:cNvPr id="2" name="Freeform 1">
+            <a:extLst>
+              <a:ext uri="{FF2B5EF4-FFF2-40B4-BE49-F238E27FC236}">
+                <a16:creationId xmlns:a16="http://schemas.microsoft.com/office/drawing/2014/main" id="{786F5C88-098F-BC44-3FC0-723911A69D20}"/>
+              </a:ext>
+            </a:extLst>
+          </p:cNvPr>
+          <p:cNvSpPr/>
+          <p:nvPr/>
+        </p:nvSpPr>
+        <p:spPr>
+          <a:xfrm>
+            <a:off x="2199567" y="2674961"/>
+            <a:ext cx="1842448" cy="1940253"/>
+          </a:xfrm>
+          <a:custGeom>
+            <a:avLst/>
+            <a:gdLst>
+              <a:gd name="connsiteX0" fmla="*/ 0 w 1842448"/>
+              <a:gd name="connsiteY0" fmla="*/ 0 h 2470245"/>
+              <a:gd name="connsiteX1" fmla="*/ 13648 w 1842448"/>
+              <a:gd name="connsiteY1" fmla="*/ 286603 h 2470245"/>
+              <a:gd name="connsiteX2" fmla="*/ 40943 w 1842448"/>
+              <a:gd name="connsiteY2" fmla="*/ 559558 h 2470245"/>
+              <a:gd name="connsiteX3" fmla="*/ 68239 w 1842448"/>
+              <a:gd name="connsiteY3" fmla="*/ 900752 h 2470245"/>
+              <a:gd name="connsiteX4" fmla="*/ 109182 w 1842448"/>
+              <a:gd name="connsiteY4" fmla="*/ 1201003 h 2470245"/>
+              <a:gd name="connsiteX5" fmla="*/ 163773 w 1842448"/>
+              <a:gd name="connsiteY5" fmla="*/ 1473958 h 2470245"/>
+              <a:gd name="connsiteX6" fmla="*/ 286603 w 1842448"/>
+              <a:gd name="connsiteY6" fmla="*/ 1746913 h 2470245"/>
+              <a:gd name="connsiteX7" fmla="*/ 573206 w 1842448"/>
+              <a:gd name="connsiteY7" fmla="*/ 1965277 h 2470245"/>
+              <a:gd name="connsiteX8" fmla="*/ 928048 w 1842448"/>
+              <a:gd name="connsiteY8" fmla="*/ 2115403 h 2470245"/>
+              <a:gd name="connsiteX9" fmla="*/ 1269242 w 1842448"/>
+              <a:gd name="connsiteY9" fmla="*/ 2251880 h 2470245"/>
+              <a:gd name="connsiteX10" fmla="*/ 1514902 w 1842448"/>
+              <a:gd name="connsiteY10" fmla="*/ 2347415 h 2470245"/>
+              <a:gd name="connsiteX11" fmla="*/ 1842448 w 1842448"/>
+              <a:gd name="connsiteY11" fmla="*/ 2470245 h 2470245"/>
+            </a:gdLst>
+            <a:ahLst/>
+            <a:cxnLst>
+              <a:cxn ang="0">
+                <a:pos x="connsiteX0" y="connsiteY0"/>
+              </a:cxn>
+              <a:cxn ang="0">
+                <a:pos x="connsiteX1" y="connsiteY1"/>
+              </a:cxn>
+              <a:cxn ang="0">
+                <a:pos x="connsiteX2" y="connsiteY2"/>
+              </a:cxn>
+              <a:cxn ang="0">
+                <a:pos x="connsiteX3" y="connsiteY3"/>
+              </a:cxn>
+              <a:cxn ang="0">
+                <a:pos x="connsiteX4" y="connsiteY4"/>
+              </a:cxn>
+              <a:cxn ang="0">
+                <a:pos x="connsiteX5" y="connsiteY5"/>
+              </a:cxn>
+              <a:cxn ang="0">
+                <a:pos x="connsiteX6" y="connsiteY6"/>
+              </a:cxn>
+              <a:cxn ang="0">
+                <a:pos x="connsiteX7" y="connsiteY7"/>
+              </a:cxn>
+              <a:cxn ang="0">
+                <a:pos x="connsiteX8" y="connsiteY8"/>
+              </a:cxn>
+              <a:cxn ang="0">
+                <a:pos x="connsiteX9" y="connsiteY9"/>
+              </a:cxn>
+              <a:cxn ang="0">
+                <a:pos x="connsiteX10" y="connsiteY10"/>
+              </a:cxn>
+              <a:cxn ang="0">
+                <a:pos x="connsiteX11" y="connsiteY11"/>
+              </a:cxn>
+            </a:cxnLst>
+            <a:rect l="l" t="t" r="r" b="b"/>
+            <a:pathLst>
+              <a:path w="1842448" h="2470245">
+                <a:moveTo>
+                  <a:pt x="0" y="0"/>
+                </a:moveTo>
+                <a:cubicBezTo>
+                  <a:pt x="3412" y="96671"/>
+                  <a:pt x="6824" y="193343"/>
+                  <a:pt x="13648" y="286603"/>
+                </a:cubicBezTo>
+                <a:cubicBezTo>
+                  <a:pt x="20472" y="379863"/>
+                  <a:pt x="31845" y="457200"/>
+                  <a:pt x="40943" y="559558"/>
+                </a:cubicBezTo>
+                <a:cubicBezTo>
+                  <a:pt x="50042" y="661916"/>
+                  <a:pt x="56866" y="793845"/>
+                  <a:pt x="68239" y="900752"/>
+                </a:cubicBezTo>
+                <a:cubicBezTo>
+                  <a:pt x="79612" y="1007659"/>
+                  <a:pt x="93260" y="1105469"/>
+                  <a:pt x="109182" y="1201003"/>
+                </a:cubicBezTo>
+                <a:cubicBezTo>
+                  <a:pt x="125104" y="1296537"/>
+                  <a:pt x="134203" y="1382973"/>
+                  <a:pt x="163773" y="1473958"/>
+                </a:cubicBezTo>
+                <a:cubicBezTo>
+                  <a:pt x="193343" y="1564943"/>
+                  <a:pt x="218364" y="1665027"/>
+                  <a:pt x="286603" y="1746913"/>
+                </a:cubicBezTo>
+                <a:cubicBezTo>
+                  <a:pt x="354842" y="1828799"/>
+                  <a:pt x="466299" y="1903862"/>
+                  <a:pt x="573206" y="1965277"/>
+                </a:cubicBezTo>
+                <a:cubicBezTo>
+                  <a:pt x="680114" y="2026692"/>
+                  <a:pt x="812042" y="2067636"/>
+                  <a:pt x="928048" y="2115403"/>
+                </a:cubicBezTo>
+                <a:cubicBezTo>
+                  <a:pt x="1044054" y="2163170"/>
+                  <a:pt x="1269242" y="2251880"/>
+                  <a:pt x="1269242" y="2251880"/>
+                </a:cubicBezTo>
+                <a:lnTo>
+                  <a:pt x="1514902" y="2347415"/>
+                </a:lnTo>
+                <a:lnTo>
+                  <a:pt x="1842448" y="2470245"/>
+                </a:lnTo>
+              </a:path>
+            </a:pathLst>
+          </a:custGeom>
+          <a:ln w="127000">
+            <a:solidFill>
+              <a:schemeClr val="accent1"/>
+            </a:solidFill>
+          </a:ln>
+        </p:spPr>
+        <p:style>
+          <a:lnRef idx="3">
+            <a:schemeClr val="dk1"/>
+          </a:lnRef>
+          <a:fillRef idx="0">
+            <a:schemeClr val="dk1"/>
+          </a:fillRef>
+          <a:effectRef idx="2">
+            <a:schemeClr val="dk1"/>
+          </a:effectRef>
+          <a:fontRef idx="minor">
+            <a:schemeClr val="tx1"/>
+          </a:fontRef>
+        </p:style>
+        <p:txBody>
+          <a:bodyPr rtlCol="0" anchor="ctr"/>
+          <a:lstStyle/>
+          <a:p>
+            <a:pPr algn="ctr"/>
+            <a:endParaRPr lang="en-US">
+              <a:solidFill>
+                <a:srgbClr val="0070C0"/>
+              </a:solidFill>
+            </a:endParaRPr>
+          </a:p>
+        </p:txBody>
+      </p:sp>
+    </p:spTree>
+    <p:extLst>
+      <p:ext uri="{BB962C8B-B14F-4D97-AF65-F5344CB8AC3E}">
+        <p14:creationId xmlns:p14="http://schemas.microsoft.com/office/powerpoint/2010/main" val="793148075"/>
+      </p:ext>
+    </p:extLst>
+  </p:cSld>
+  <p:clrMapOvr>
+    <a:masterClrMapping/>
+  </p:clrMapOvr>
+</p:sld>
+</file>
+
+<file path=ppt/slides/slide15.xml><?xml version="1.0" encoding="utf-8"?>
+<p:sld xmlns:a="http://schemas.openxmlformats.org/drawingml/2006/main" xmlns:r="http://schemas.openxmlformats.org/officeDocument/2006/relationships" xmlns:p="http://schemas.openxmlformats.org/presentationml/2006/main">
+  <p:cSld>
+    <p:spTree>
+      <p:nvGrpSpPr>
+        <p:cNvPr id="1" name=""/>
+        <p:cNvGrpSpPr/>
+        <p:nvPr/>
+      </p:nvGrpSpPr>
+      <p:grpSpPr>
+        <a:xfrm>
+          <a:off x="0" y="0"/>
+          <a:ext cx="0" cy="0"/>
+          <a:chOff x="0" y="0"/>
+          <a:chExt cx="0" cy="0"/>
+        </a:xfrm>
+      </p:grpSpPr>
+      <p:sp>
+        <p:nvSpPr>
+          <p:cNvPr id="14" name="TextBox 13">
+            <a:extLst>
+              <a:ext uri="{FF2B5EF4-FFF2-40B4-BE49-F238E27FC236}">
+                <a16:creationId xmlns:a16="http://schemas.microsoft.com/office/drawing/2014/main" id="{C343D616-46A1-3B4D-AE72-967E282CF7BB}"/>
+              </a:ext>
+            </a:extLst>
+          </p:cNvPr>
+          <p:cNvSpPr txBox="1"/>
+          <p:nvPr/>
+        </p:nvSpPr>
+        <p:spPr>
+          <a:xfrm>
+            <a:off x="6096000" y="965712"/>
+            <a:ext cx="6057229" cy="4154984"/>
+          </a:xfrm>
+          <a:prstGeom prst="rect">
+            <a:avLst/>
+          </a:prstGeom>
+          <a:noFill/>
+        </p:spPr>
+        <p:txBody>
+          <a:bodyPr wrap="square" rtlCol="0">
+            <a:spAutoFit/>
+          </a:bodyPr>
+          <a:lstStyle/>
+          <a:p>
+            <a:r>
+              <a:rPr lang="en-US" sz="2400" dirty="0"/>
+              <a:t>This marks a constant-temperature slice (“</a:t>
+            </a:r>
+            <a:r>
+              <a:rPr lang="en-US" sz="2400" b="1" dirty="0"/>
+              <a:t>isotherm</a:t>
+            </a:r>
+            <a:r>
+              <a:rPr lang="en-US" sz="2400" dirty="0"/>
+              <a:t>”) through </a:t>
+            </a:r>
+            <a:r>
+              <a:rPr lang="en-US" sz="2400" i="1" dirty="0"/>
+              <a:t>P(T,V). </a:t>
+            </a:r>
+            <a:r>
+              <a:rPr lang="en-US" sz="2400" dirty="0"/>
+              <a:t>In this case, the isotherm temperature is </a:t>
+            </a:r>
+            <a:r>
+              <a:rPr lang="en-US" sz="2400" dirty="0">
+                <a:solidFill>
+                  <a:srgbClr val="FF0000"/>
+                </a:solidFill>
+              </a:rPr>
+              <a:t>350 K</a:t>
+            </a:r>
+            <a:r>
+              <a:rPr lang="en-US" sz="2400" dirty="0"/>
+              <a:t>.</a:t>
+            </a:r>
+          </a:p>
+          <a:p>
+            <a:endParaRPr lang="en-US" sz="2400" dirty="0"/>
+          </a:p>
+          <a:p>
+            <a:r>
+              <a:rPr lang="en-US" sz="2400" dirty="0"/>
+              <a:t>This isotherm is colder, at </a:t>
+            </a:r>
+            <a:r>
+              <a:rPr lang="en-US" sz="2400" dirty="0">
+                <a:solidFill>
+                  <a:schemeClr val="accent1"/>
+                </a:solidFill>
+              </a:rPr>
+              <a:t>300 K</a:t>
+            </a:r>
+            <a:r>
+              <a:rPr lang="en-US" sz="2400" dirty="0"/>
+              <a:t>.</a:t>
+            </a:r>
+          </a:p>
+          <a:p>
+            <a:endParaRPr lang="en-US" sz="2400" dirty="0"/>
+          </a:p>
+          <a:p>
+            <a:r>
+              <a:rPr lang="en-US" sz="2400" dirty="0"/>
+              <a:t>The word isotherm applies to any thermodynamic function, but when we’re talking </a:t>
+            </a:r>
+            <a:r>
+              <a:rPr lang="en-US" sz="2400" i="1" dirty="0"/>
+              <a:t>P(T,V)</a:t>
+            </a:r>
+            <a:r>
+              <a:rPr lang="en-US" sz="2400" dirty="0"/>
+              <a:t>, the isotherms are called </a:t>
+            </a:r>
+            <a:r>
+              <a:rPr lang="en-US" sz="2400" b="1" dirty="0"/>
+              <a:t>Boyle isotherms</a:t>
+            </a:r>
+            <a:r>
+              <a:rPr lang="en-US" sz="2400" dirty="0"/>
+              <a:t>. So here is a </a:t>
+            </a:r>
+            <a:r>
+              <a:rPr lang="en-US" sz="2400" dirty="0">
+                <a:solidFill>
+                  <a:srgbClr val="FF0000"/>
+                </a:solidFill>
+              </a:rPr>
+              <a:t>hot Boyle isotherm </a:t>
+            </a:r>
+            <a:r>
+              <a:rPr lang="en-US" sz="2400" dirty="0"/>
+              <a:t>and a </a:t>
+            </a:r>
+            <a:r>
+              <a:rPr lang="en-US" sz="2400" dirty="0">
+                <a:solidFill>
+                  <a:schemeClr val="accent1"/>
+                </a:solidFill>
+              </a:rPr>
+              <a:t>cold Boyle isotherm</a:t>
+            </a:r>
+            <a:r>
+              <a:rPr lang="en-US" sz="2400" dirty="0"/>
+              <a:t>.</a:t>
+            </a:r>
+          </a:p>
+        </p:txBody>
+      </p:sp>
+      <p:sp>
+        <p:nvSpPr>
+          <p:cNvPr id="27" name="TextBox 26">
+            <a:extLst>
+              <a:ext uri="{FF2B5EF4-FFF2-40B4-BE49-F238E27FC236}">
+                <a16:creationId xmlns:a16="http://schemas.microsoft.com/office/drawing/2014/main" id="{B7C40E99-40E1-8243-B2B0-3050659C7564}"/>
+              </a:ext>
+            </a:extLst>
+          </p:cNvPr>
+          <p:cNvSpPr txBox="1"/>
+          <p:nvPr/>
+        </p:nvSpPr>
+        <p:spPr>
+          <a:xfrm>
+            <a:off x="688678" y="377142"/>
+            <a:ext cx="4700186" cy="830997"/>
+          </a:xfrm>
+          <a:prstGeom prst="rect">
+            <a:avLst/>
+          </a:prstGeom>
+          <a:noFill/>
+        </p:spPr>
+        <p:txBody>
+          <a:bodyPr wrap="square" rtlCol="0">
+            <a:spAutoFit/>
+          </a:bodyPr>
+          <a:lstStyle/>
+          <a:p>
+            <a:r>
+              <a:rPr lang="en-US" sz="2400" b="1" dirty="0"/>
+              <a:t>Isotherm: a slices through a thermodynamic surface</a:t>
+            </a:r>
+          </a:p>
+        </p:txBody>
+      </p:sp>
+      <p:pic>
+        <p:nvPicPr>
+          <p:cNvPr id="19" name="Picture 18">
+            <a:extLst>
+              <a:ext uri="{FF2B5EF4-FFF2-40B4-BE49-F238E27FC236}">
+                <a16:creationId xmlns:a16="http://schemas.microsoft.com/office/drawing/2014/main" id="{A2334EC2-B195-804D-89E6-FA40FB35C3A1}"/>
+              </a:ext>
+            </a:extLst>
+          </p:cNvPr>
+          <p:cNvPicPr>
+            <a:picLocks noChangeAspect="1"/>
+          </p:cNvPicPr>
+          <p:nvPr/>
+        </p:nvPicPr>
+        <p:blipFill>
+          <a:blip r:embed="rId2"/>
+          <a:stretch>
+            <a:fillRect/>
+          </a:stretch>
+        </p:blipFill>
+        <p:spPr>
+          <a:xfrm>
+            <a:off x="170208" y="1335045"/>
+            <a:ext cx="5737126" cy="4524315"/>
+          </a:xfrm>
+          <a:prstGeom prst="rect">
+            <a:avLst/>
+          </a:prstGeom>
+        </p:spPr>
+      </p:pic>
+      <p:cxnSp>
+        <p:nvCxnSpPr>
+          <p:cNvPr id="3" name="Straight Connector 2">
+            <a:extLst>
+              <a:ext uri="{FF2B5EF4-FFF2-40B4-BE49-F238E27FC236}">
+                <a16:creationId xmlns:a16="http://schemas.microsoft.com/office/drawing/2014/main" id="{6407B16E-9BA6-C9D7-0117-BDC4253622B8}"/>
+              </a:ext>
+            </a:extLst>
+          </p:cNvPr>
+          <p:cNvCxnSpPr/>
+          <p:nvPr/>
+        </p:nvCxnSpPr>
+        <p:spPr>
+          <a:xfrm>
+            <a:off x="1433015" y="2456597"/>
+            <a:ext cx="0" cy="436728"/>
+          </a:xfrm>
+          <a:prstGeom prst="line">
+            <a:avLst/>
+          </a:prstGeom>
+        </p:spPr>
+        <p:style>
+          <a:lnRef idx="1">
+            <a:schemeClr val="accent1"/>
+          </a:lnRef>
+          <a:fillRef idx="0">
+            <a:schemeClr val="accent1"/>
+          </a:fillRef>
+          <a:effectRef idx="0">
+            <a:schemeClr val="accent1"/>
+          </a:effectRef>
+          <a:fontRef idx="minor">
+            <a:schemeClr val="tx1"/>
+          </a:fontRef>
+        </p:style>
+      </p:cxnSp>
+      <p:sp>
+        <p:nvSpPr>
+          <p:cNvPr id="4" name="Freeform 3">
+            <a:extLst>
+              <a:ext uri="{FF2B5EF4-FFF2-40B4-BE49-F238E27FC236}">
+                <a16:creationId xmlns:a16="http://schemas.microsoft.com/office/drawing/2014/main" id="{55A78C68-407D-0878-690A-753EC53FEBAB}"/>
+              </a:ext>
+            </a:extLst>
+          </p:cNvPr>
+          <p:cNvSpPr/>
+          <p:nvPr/>
+        </p:nvSpPr>
+        <p:spPr>
+          <a:xfrm>
+            <a:off x="1828801" y="2579427"/>
+            <a:ext cx="1842448" cy="2210935"/>
+          </a:xfrm>
+          <a:custGeom>
+            <a:avLst/>
+            <a:gdLst>
+              <a:gd name="connsiteX0" fmla="*/ 0 w 1842448"/>
+              <a:gd name="connsiteY0" fmla="*/ 0 h 2470245"/>
+              <a:gd name="connsiteX1" fmla="*/ 13648 w 1842448"/>
+              <a:gd name="connsiteY1" fmla="*/ 286603 h 2470245"/>
+              <a:gd name="connsiteX2" fmla="*/ 40943 w 1842448"/>
+              <a:gd name="connsiteY2" fmla="*/ 559558 h 2470245"/>
+              <a:gd name="connsiteX3" fmla="*/ 68239 w 1842448"/>
+              <a:gd name="connsiteY3" fmla="*/ 900752 h 2470245"/>
+              <a:gd name="connsiteX4" fmla="*/ 109182 w 1842448"/>
+              <a:gd name="connsiteY4" fmla="*/ 1201003 h 2470245"/>
+              <a:gd name="connsiteX5" fmla="*/ 163773 w 1842448"/>
+              <a:gd name="connsiteY5" fmla="*/ 1473958 h 2470245"/>
+              <a:gd name="connsiteX6" fmla="*/ 286603 w 1842448"/>
+              <a:gd name="connsiteY6" fmla="*/ 1746913 h 2470245"/>
+              <a:gd name="connsiteX7" fmla="*/ 573206 w 1842448"/>
+              <a:gd name="connsiteY7" fmla="*/ 1965277 h 2470245"/>
+              <a:gd name="connsiteX8" fmla="*/ 928048 w 1842448"/>
+              <a:gd name="connsiteY8" fmla="*/ 2115403 h 2470245"/>
+              <a:gd name="connsiteX9" fmla="*/ 1269242 w 1842448"/>
+              <a:gd name="connsiteY9" fmla="*/ 2251880 h 2470245"/>
+              <a:gd name="connsiteX10" fmla="*/ 1514902 w 1842448"/>
+              <a:gd name="connsiteY10" fmla="*/ 2347415 h 2470245"/>
+              <a:gd name="connsiteX11" fmla="*/ 1842448 w 1842448"/>
+              <a:gd name="connsiteY11" fmla="*/ 2470245 h 2470245"/>
+            </a:gdLst>
+            <a:ahLst/>
+            <a:cxnLst>
+              <a:cxn ang="0">
+                <a:pos x="connsiteX0" y="connsiteY0"/>
+              </a:cxn>
+              <a:cxn ang="0">
+                <a:pos x="connsiteX1" y="connsiteY1"/>
+              </a:cxn>
+              <a:cxn ang="0">
+                <a:pos x="connsiteX2" y="connsiteY2"/>
+              </a:cxn>
+              <a:cxn ang="0">
+                <a:pos x="connsiteX3" y="connsiteY3"/>
+              </a:cxn>
+              <a:cxn ang="0">
+                <a:pos x="connsiteX4" y="connsiteY4"/>
+              </a:cxn>
+              <a:cxn ang="0">
+                <a:pos x="connsiteX5" y="connsiteY5"/>
+              </a:cxn>
+              <a:cxn ang="0">
+                <a:pos x="connsiteX6" y="connsiteY6"/>
+              </a:cxn>
+              <a:cxn ang="0">
+                <a:pos x="connsiteX7" y="connsiteY7"/>
+              </a:cxn>
+              <a:cxn ang="0">
+                <a:pos x="connsiteX8" y="connsiteY8"/>
+              </a:cxn>
+              <a:cxn ang="0">
+                <a:pos x="connsiteX9" y="connsiteY9"/>
+              </a:cxn>
+              <a:cxn ang="0">
+                <a:pos x="connsiteX10" y="connsiteY10"/>
+              </a:cxn>
+              <a:cxn ang="0">
+                <a:pos x="connsiteX11" y="connsiteY11"/>
+              </a:cxn>
+            </a:cxnLst>
+            <a:rect l="l" t="t" r="r" b="b"/>
+            <a:pathLst>
+              <a:path w="1842448" h="2470245">
+                <a:moveTo>
+                  <a:pt x="0" y="0"/>
+                </a:moveTo>
+                <a:cubicBezTo>
+                  <a:pt x="3412" y="96671"/>
+                  <a:pt x="6824" y="193343"/>
+                  <a:pt x="13648" y="286603"/>
+                </a:cubicBezTo>
+                <a:cubicBezTo>
+                  <a:pt x="20472" y="379863"/>
+                  <a:pt x="31845" y="457200"/>
+                  <a:pt x="40943" y="559558"/>
+                </a:cubicBezTo>
+                <a:cubicBezTo>
+                  <a:pt x="50042" y="661916"/>
+                  <a:pt x="56866" y="793845"/>
+                  <a:pt x="68239" y="900752"/>
+                </a:cubicBezTo>
+                <a:cubicBezTo>
+                  <a:pt x="79612" y="1007659"/>
+                  <a:pt x="93260" y="1105469"/>
+                  <a:pt x="109182" y="1201003"/>
+                </a:cubicBezTo>
+                <a:cubicBezTo>
+                  <a:pt x="125104" y="1296537"/>
+                  <a:pt x="134203" y="1382973"/>
+                  <a:pt x="163773" y="1473958"/>
+                </a:cubicBezTo>
+                <a:cubicBezTo>
+                  <a:pt x="193343" y="1564943"/>
+                  <a:pt x="218364" y="1665027"/>
+                  <a:pt x="286603" y="1746913"/>
+                </a:cubicBezTo>
+                <a:cubicBezTo>
+                  <a:pt x="354842" y="1828799"/>
+                  <a:pt x="466299" y="1903862"/>
+                  <a:pt x="573206" y="1965277"/>
+                </a:cubicBezTo>
+                <a:cubicBezTo>
+                  <a:pt x="680114" y="2026692"/>
+                  <a:pt x="812042" y="2067636"/>
+                  <a:pt x="928048" y="2115403"/>
+                </a:cubicBezTo>
+                <a:cubicBezTo>
+                  <a:pt x="1044054" y="2163170"/>
+                  <a:pt x="1269242" y="2251880"/>
+                  <a:pt x="1269242" y="2251880"/>
+                </a:cubicBezTo>
+                <a:lnTo>
+                  <a:pt x="1514902" y="2347415"/>
+                </a:lnTo>
+                <a:lnTo>
+                  <a:pt x="1842448" y="2470245"/>
+                </a:lnTo>
+              </a:path>
+            </a:pathLst>
+          </a:custGeom>
+          <a:ln w="127000">
+            <a:solidFill>
+              <a:srgbClr val="FF0000"/>
+            </a:solidFill>
+          </a:ln>
+        </p:spPr>
+        <p:style>
+          <a:lnRef idx="3">
+            <a:schemeClr val="dk1"/>
+          </a:lnRef>
+          <a:fillRef idx="0">
+            <a:schemeClr val="dk1"/>
+          </a:fillRef>
+          <a:effectRef idx="2">
+            <a:schemeClr val="dk1"/>
+          </a:effectRef>
+          <a:fontRef idx="minor">
+            <a:schemeClr val="tx1"/>
+          </a:fontRef>
+        </p:style>
+        <p:txBody>
+          <a:bodyPr rtlCol="0" anchor="ctr"/>
+          <a:lstStyle/>
+          <a:p>
+            <a:pPr algn="ctr"/>
+            <a:endParaRPr lang="en-US"/>
+          </a:p>
+        </p:txBody>
+      </p:sp>
+      <p:sp>
+        <p:nvSpPr>
+          <p:cNvPr id="2" name="Freeform 1">
+            <a:extLst>
+              <a:ext uri="{FF2B5EF4-FFF2-40B4-BE49-F238E27FC236}">
+                <a16:creationId xmlns:a16="http://schemas.microsoft.com/office/drawing/2014/main" id="{786F5C88-098F-BC44-3FC0-723911A69D20}"/>
+              </a:ext>
+            </a:extLst>
+          </p:cNvPr>
+          <p:cNvSpPr/>
+          <p:nvPr/>
+        </p:nvSpPr>
+        <p:spPr>
+          <a:xfrm>
+            <a:off x="2199567" y="2674961"/>
+            <a:ext cx="1842448" cy="1940253"/>
+          </a:xfrm>
+          <a:custGeom>
+            <a:avLst/>
+            <a:gdLst>
+              <a:gd name="connsiteX0" fmla="*/ 0 w 1842448"/>
+              <a:gd name="connsiteY0" fmla="*/ 0 h 2470245"/>
+              <a:gd name="connsiteX1" fmla="*/ 13648 w 1842448"/>
+              <a:gd name="connsiteY1" fmla="*/ 286603 h 2470245"/>
+              <a:gd name="connsiteX2" fmla="*/ 40943 w 1842448"/>
+              <a:gd name="connsiteY2" fmla="*/ 559558 h 2470245"/>
+              <a:gd name="connsiteX3" fmla="*/ 68239 w 1842448"/>
+              <a:gd name="connsiteY3" fmla="*/ 900752 h 2470245"/>
+              <a:gd name="connsiteX4" fmla="*/ 109182 w 1842448"/>
+              <a:gd name="connsiteY4" fmla="*/ 1201003 h 2470245"/>
+              <a:gd name="connsiteX5" fmla="*/ 163773 w 1842448"/>
+              <a:gd name="connsiteY5" fmla="*/ 1473958 h 2470245"/>
+              <a:gd name="connsiteX6" fmla="*/ 286603 w 1842448"/>
+              <a:gd name="connsiteY6" fmla="*/ 1746913 h 2470245"/>
+              <a:gd name="connsiteX7" fmla="*/ 573206 w 1842448"/>
+              <a:gd name="connsiteY7" fmla="*/ 1965277 h 2470245"/>
+              <a:gd name="connsiteX8" fmla="*/ 928048 w 1842448"/>
+              <a:gd name="connsiteY8" fmla="*/ 2115403 h 2470245"/>
+              <a:gd name="connsiteX9" fmla="*/ 1269242 w 1842448"/>
+              <a:gd name="connsiteY9" fmla="*/ 2251880 h 2470245"/>
+              <a:gd name="connsiteX10" fmla="*/ 1514902 w 1842448"/>
+              <a:gd name="connsiteY10" fmla="*/ 2347415 h 2470245"/>
+              <a:gd name="connsiteX11" fmla="*/ 1842448 w 1842448"/>
+              <a:gd name="connsiteY11" fmla="*/ 2470245 h 2470245"/>
+            </a:gdLst>
+            <a:ahLst/>
+            <a:cxnLst>
+              <a:cxn ang="0">
+                <a:pos x="connsiteX0" y="connsiteY0"/>
+              </a:cxn>
+              <a:cxn ang="0">
+                <a:pos x="connsiteX1" y="connsiteY1"/>
+              </a:cxn>
+              <a:cxn ang="0">
+                <a:pos x="connsiteX2" y="connsiteY2"/>
+              </a:cxn>
+              <a:cxn ang="0">
+                <a:pos x="connsiteX3" y="connsiteY3"/>
+              </a:cxn>
+              <a:cxn ang="0">
+                <a:pos x="connsiteX4" y="connsiteY4"/>
+              </a:cxn>
+              <a:cxn ang="0">
+                <a:pos x="connsiteX5" y="connsiteY5"/>
+              </a:cxn>
+              <a:cxn ang="0">
+                <a:pos x="connsiteX6" y="connsiteY6"/>
+              </a:cxn>
+              <a:cxn ang="0">
+                <a:pos x="connsiteX7" y="connsiteY7"/>
+              </a:cxn>
+              <a:cxn ang="0">
+                <a:pos x="connsiteX8" y="connsiteY8"/>
+              </a:cxn>
+              <a:cxn ang="0">
+                <a:pos x="connsiteX9" y="connsiteY9"/>
+              </a:cxn>
+              <a:cxn ang="0">
+                <a:pos x="connsiteX10" y="connsiteY10"/>
+              </a:cxn>
+              <a:cxn ang="0">
+                <a:pos x="connsiteX11" y="connsiteY11"/>
+              </a:cxn>
+            </a:cxnLst>
+            <a:rect l="l" t="t" r="r" b="b"/>
+            <a:pathLst>
+              <a:path w="1842448" h="2470245">
+                <a:moveTo>
+                  <a:pt x="0" y="0"/>
+                </a:moveTo>
+                <a:cubicBezTo>
+                  <a:pt x="3412" y="96671"/>
+                  <a:pt x="6824" y="193343"/>
+                  <a:pt x="13648" y="286603"/>
+                </a:cubicBezTo>
+                <a:cubicBezTo>
+                  <a:pt x="20472" y="379863"/>
+                  <a:pt x="31845" y="457200"/>
+                  <a:pt x="40943" y="559558"/>
+                </a:cubicBezTo>
+                <a:cubicBezTo>
+                  <a:pt x="50042" y="661916"/>
+                  <a:pt x="56866" y="793845"/>
+                  <a:pt x="68239" y="900752"/>
+                </a:cubicBezTo>
+                <a:cubicBezTo>
+                  <a:pt x="79612" y="1007659"/>
+                  <a:pt x="93260" y="1105469"/>
+                  <a:pt x="109182" y="1201003"/>
+                </a:cubicBezTo>
+                <a:cubicBezTo>
+                  <a:pt x="125104" y="1296537"/>
+                  <a:pt x="134203" y="1382973"/>
+                  <a:pt x="163773" y="1473958"/>
+                </a:cubicBezTo>
+                <a:cubicBezTo>
+                  <a:pt x="193343" y="1564943"/>
+                  <a:pt x="218364" y="1665027"/>
+                  <a:pt x="286603" y="1746913"/>
+                </a:cubicBezTo>
+                <a:cubicBezTo>
+                  <a:pt x="354842" y="1828799"/>
+                  <a:pt x="466299" y="1903862"/>
+                  <a:pt x="573206" y="1965277"/>
+                </a:cubicBezTo>
+                <a:cubicBezTo>
+                  <a:pt x="680114" y="2026692"/>
+                  <a:pt x="812042" y="2067636"/>
+                  <a:pt x="928048" y="2115403"/>
+                </a:cubicBezTo>
+                <a:cubicBezTo>
+                  <a:pt x="1044054" y="2163170"/>
+                  <a:pt x="1269242" y="2251880"/>
+                  <a:pt x="1269242" y="2251880"/>
+                </a:cubicBezTo>
+                <a:lnTo>
+                  <a:pt x="1514902" y="2347415"/>
+                </a:lnTo>
+                <a:lnTo>
+                  <a:pt x="1842448" y="2470245"/>
+                </a:lnTo>
+              </a:path>
+            </a:pathLst>
+          </a:custGeom>
+          <a:ln w="127000">
+            <a:solidFill>
+              <a:schemeClr val="accent1"/>
+            </a:solidFill>
+          </a:ln>
+        </p:spPr>
+        <p:style>
+          <a:lnRef idx="3">
+            <a:schemeClr val="dk1"/>
+          </a:lnRef>
+          <a:fillRef idx="0">
+            <a:schemeClr val="dk1"/>
+          </a:fillRef>
+          <a:effectRef idx="2">
+            <a:schemeClr val="dk1"/>
+          </a:effectRef>
+          <a:fontRef idx="minor">
+            <a:schemeClr val="tx1"/>
+          </a:fontRef>
+        </p:style>
+        <p:txBody>
+          <a:bodyPr rtlCol="0" anchor="ctr"/>
+          <a:lstStyle/>
+          <a:p>
+            <a:pPr algn="ctr"/>
+            <a:endParaRPr lang="en-US">
+              <a:solidFill>
+                <a:srgbClr val="0070C0"/>
+              </a:solidFill>
+            </a:endParaRPr>
+          </a:p>
+        </p:txBody>
+      </p:sp>
+    </p:spTree>
+    <p:extLst>
+      <p:ext uri="{BB962C8B-B14F-4D97-AF65-F5344CB8AC3E}">
+        <p14:creationId xmlns:p14="http://schemas.microsoft.com/office/powerpoint/2010/main" val="2614192066"/>
+      </p:ext>
+    </p:extLst>
+  </p:cSld>
+  <p:clrMapOvr>
+    <a:masterClrMapping/>
+  </p:clrMapOvr>
+</p:sld>
+</file>
+
+<file path=ppt/slides/slide16.xml><?xml version="1.0" encoding="utf-8"?>
+<p:sld xmlns:a="http://schemas.openxmlformats.org/drawingml/2006/main" xmlns:r="http://schemas.openxmlformats.org/officeDocument/2006/relationships" xmlns:p="http://schemas.openxmlformats.org/presentationml/2006/main">
+  <p:cSld>
+    <p:spTree>
+      <p:nvGrpSpPr>
+        <p:cNvPr id="1" name=""/>
+        <p:cNvGrpSpPr/>
+        <p:nvPr/>
+      </p:nvGrpSpPr>
+      <p:grpSpPr>
+        <a:xfrm>
+          <a:off x="0" y="0"/>
+          <a:ext cx="0" cy="0"/>
+          <a:chOff x="0" y="0"/>
+          <a:chExt cx="0" cy="0"/>
+        </a:xfrm>
+      </p:grpSpPr>
+      <p:sp>
+        <p:nvSpPr>
           <p:cNvPr id="28" name="TextBox 27">
             <a:extLst>
               <a:ext uri="{FF2B5EF4-FFF2-40B4-BE49-F238E27FC236}">
@@ -6240,7 +7810,15 @@
             </a:r>
             <a:r>
               <a:rPr lang="en-US" sz="2400" i="1" dirty="0"/>
-              <a:t>state functions, state spaces, </a:t>
+              <a:t>state functions, state spaces, isotherms</a:t>
+            </a:r>
+            <a:r>
+              <a:rPr lang="en-US" sz="2400" dirty="0"/>
+              <a:t>,</a:t>
+            </a:r>
+            <a:r>
+              <a:rPr lang="en-US" sz="2400" i="1" dirty="0"/>
+              <a:t> </a:t>
             </a:r>
             <a:r>
               <a:rPr lang="en-US" sz="2400" dirty="0"/>

</xml_diff>